<commit_message>
Update architecture.pptx and README.md/
</commit_message>
<xml_diff>
--- a/architecture.pptx
+++ b/architecture.pptx
@@ -107,6 +107,11 @@
       </a:defRPr>
     </a:lvl9pPr>
   </p:defaultTextStyle>
+  <p:extLst>
+    <p:ext uri="{EFAFB233-063F-42B5-8137-9DF3F51BA10A}">
+      <p15:sldGuideLst xmlns:p15="http://schemas.microsoft.com/office/powerpoint/2012/main"/>
+    </p:ext>
+  </p:extLst>
 </p:presentation>
 </file>
 
@@ -241,7 +246,7 @@
           <a:p>
             <a:fld id="{7A104727-0C57-3C42-B96D-2CB341E10E9C}" type="datetimeFigureOut">
               <a:rPr kumimoji="1" lang="ja-JP" altLang="en-US" smtClean="0"/>
-              <a:t>2020/11/8</a:t>
+              <a:t>2020/11/14</a:t>
             </a:fld>
             <a:endParaRPr kumimoji="1" lang="ja-JP" altLang="en-US"/>
           </a:p>
@@ -443,7 +448,7 @@
           <a:p>
             <a:fld id="{7A104727-0C57-3C42-B96D-2CB341E10E9C}" type="datetimeFigureOut">
               <a:rPr kumimoji="1" lang="ja-JP" altLang="en-US" smtClean="0"/>
-              <a:t>2020/11/8</a:t>
+              <a:t>2020/11/14</a:t>
             </a:fld>
             <a:endParaRPr kumimoji="1" lang="ja-JP" altLang="en-US"/>
           </a:p>
@@ -655,7 +660,7 @@
           <a:p>
             <a:fld id="{7A104727-0C57-3C42-B96D-2CB341E10E9C}" type="datetimeFigureOut">
               <a:rPr kumimoji="1" lang="ja-JP" altLang="en-US" smtClean="0"/>
-              <a:t>2020/11/8</a:t>
+              <a:t>2020/11/14</a:t>
             </a:fld>
             <a:endParaRPr kumimoji="1" lang="ja-JP" altLang="en-US"/>
           </a:p>
@@ -857,7 +862,7 @@
           <a:p>
             <a:fld id="{7A104727-0C57-3C42-B96D-2CB341E10E9C}" type="datetimeFigureOut">
               <a:rPr kumimoji="1" lang="ja-JP" altLang="en-US" smtClean="0"/>
-              <a:t>2020/11/8</a:t>
+              <a:t>2020/11/14</a:t>
             </a:fld>
             <a:endParaRPr kumimoji="1" lang="ja-JP" altLang="en-US"/>
           </a:p>
@@ -1101,7 +1106,7 @@
           <a:p>
             <a:fld id="{7A104727-0C57-3C42-B96D-2CB341E10E9C}" type="datetimeFigureOut">
               <a:rPr kumimoji="1" lang="ja-JP" altLang="en-US" smtClean="0"/>
-              <a:t>2020/11/8</a:t>
+              <a:t>2020/11/14</a:t>
             </a:fld>
             <a:endParaRPr kumimoji="1" lang="ja-JP" altLang="en-US"/>
           </a:p>
@@ -1397,7 +1402,7 @@
           <a:p>
             <a:fld id="{7A104727-0C57-3C42-B96D-2CB341E10E9C}" type="datetimeFigureOut">
               <a:rPr kumimoji="1" lang="ja-JP" altLang="en-US" smtClean="0"/>
-              <a:t>2020/11/8</a:t>
+              <a:t>2020/11/14</a:t>
             </a:fld>
             <a:endParaRPr kumimoji="1" lang="ja-JP" altLang="en-US"/>
           </a:p>
@@ -1828,7 +1833,7 @@
           <a:p>
             <a:fld id="{7A104727-0C57-3C42-B96D-2CB341E10E9C}" type="datetimeFigureOut">
               <a:rPr kumimoji="1" lang="ja-JP" altLang="en-US" smtClean="0"/>
-              <a:t>2020/11/8</a:t>
+              <a:t>2020/11/14</a:t>
             </a:fld>
             <a:endParaRPr kumimoji="1" lang="ja-JP" altLang="en-US"/>
           </a:p>
@@ -1946,7 +1951,7 @@
           <a:p>
             <a:fld id="{7A104727-0C57-3C42-B96D-2CB341E10E9C}" type="datetimeFigureOut">
               <a:rPr kumimoji="1" lang="ja-JP" altLang="en-US" smtClean="0"/>
-              <a:t>2020/11/8</a:t>
+              <a:t>2020/11/14</a:t>
             </a:fld>
             <a:endParaRPr kumimoji="1" lang="ja-JP" altLang="en-US"/>
           </a:p>
@@ -2041,7 +2046,7 @@
           <a:p>
             <a:fld id="{7A104727-0C57-3C42-B96D-2CB341E10E9C}" type="datetimeFigureOut">
               <a:rPr kumimoji="1" lang="ja-JP" altLang="en-US" smtClean="0"/>
-              <a:t>2020/11/8</a:t>
+              <a:t>2020/11/14</a:t>
             </a:fld>
             <a:endParaRPr kumimoji="1" lang="ja-JP" altLang="en-US"/>
           </a:p>
@@ -2350,7 +2355,7 @@
           <a:p>
             <a:fld id="{7A104727-0C57-3C42-B96D-2CB341E10E9C}" type="datetimeFigureOut">
               <a:rPr kumimoji="1" lang="ja-JP" altLang="en-US" smtClean="0"/>
-              <a:t>2020/11/8</a:t>
+              <a:t>2020/11/14</a:t>
             </a:fld>
             <a:endParaRPr kumimoji="1" lang="ja-JP" altLang="en-US"/>
           </a:p>
@@ -2607,7 +2612,7 @@
           <a:p>
             <a:fld id="{7A104727-0C57-3C42-B96D-2CB341E10E9C}" type="datetimeFigureOut">
               <a:rPr kumimoji="1" lang="ja-JP" altLang="en-US" smtClean="0"/>
-              <a:t>2020/11/8</a:t>
+              <a:t>2020/11/14</a:t>
             </a:fld>
             <a:endParaRPr kumimoji="1" lang="ja-JP" altLang="en-US"/>
           </a:p>
@@ -2852,7 +2857,7 @@
           <a:p>
             <a:fld id="{7A104727-0C57-3C42-B96D-2CB341E10E9C}" type="datetimeFigureOut">
               <a:rPr kumimoji="1" lang="ja-JP" altLang="en-US" smtClean="0"/>
-              <a:t>2020/11/8</a:t>
+              <a:t>2020/11/14</a:t>
             </a:fld>
             <a:endParaRPr kumimoji="1" lang="ja-JP" altLang="en-US"/>
           </a:p>
@@ -13705,7 +13710,7 @@
         <p:spPr>
           <a:xfrm>
             <a:off x="375765" y="2037042"/>
-            <a:ext cx="530915" cy="261610"/>
+            <a:ext cx="460382" cy="261610"/>
           </a:xfrm>
           <a:prstGeom prst="rect">
             <a:avLst/>
@@ -13720,7 +13725,7 @@
           <a:p>
             <a:r>
               <a:rPr kumimoji="1" lang="en-US" altLang="ja-JP" sz="1100" dirty="0" err="1"/>
-              <a:t>WR_n</a:t>
+              <a:t>WRn</a:t>
             </a:r>
             <a:endParaRPr kumimoji="1" lang="ja-JP" altLang="en-US" sz="1100"/>
           </a:p>
@@ -13830,7 +13835,7 @@
           </a:xfrm>
           <a:prstGeom prst="bentConnector3">
             <a:avLst>
-              <a:gd name="adj1" fmla="val 58247"/>
+              <a:gd name="adj1" fmla="val 53845"/>
             </a:avLst>
           </a:prstGeom>
           <a:ln>
@@ -14294,6 +14299,154 @@
           </p:style>
         </p:cxnSp>
       </p:grpSp>
+      <p:cxnSp>
+        <p:nvCxnSpPr>
+          <p:cNvPr id="22" name="直線矢印コネクタ 21">
+            <a:extLst>
+              <a:ext uri="{FF2B5EF4-FFF2-40B4-BE49-F238E27FC236}">
+                <a16:creationId xmlns:a16="http://schemas.microsoft.com/office/drawing/2014/main" id="{8F851735-2C14-144F-BBAA-79FD7070CA09}"/>
+              </a:ext>
+            </a:extLst>
+          </p:cNvPr>
+          <p:cNvCxnSpPr>
+            <a:cxnSpLocks/>
+            <a:stCxn id="42" idx="4"/>
+          </p:cNvCxnSpPr>
+          <p:nvPr/>
+        </p:nvCxnSpPr>
+        <p:spPr>
+          <a:xfrm>
+            <a:off x="1654032" y="2310951"/>
+            <a:ext cx="1943" cy="186360"/>
+          </a:xfrm>
+          <a:prstGeom prst="straightConnector1">
+            <a:avLst/>
+          </a:prstGeom>
+          <a:ln>
+            <a:solidFill>
+              <a:schemeClr val="tx1"/>
+            </a:solidFill>
+            <a:tailEnd type="triangle"/>
+          </a:ln>
+        </p:spPr>
+        <p:style>
+          <a:lnRef idx="1">
+            <a:schemeClr val="accent1"/>
+          </a:lnRef>
+          <a:fillRef idx="0">
+            <a:schemeClr val="accent1"/>
+          </a:fillRef>
+          <a:effectRef idx="0">
+            <a:schemeClr val="accent1"/>
+          </a:effectRef>
+          <a:fontRef idx="minor">
+            <a:schemeClr val="tx1"/>
+          </a:fontRef>
+        </p:style>
+      </p:cxnSp>
+      <p:sp>
+        <p:nvSpPr>
+          <p:cNvPr id="42" name="円/楕円 41">
+            <a:extLst>
+              <a:ext uri="{FF2B5EF4-FFF2-40B4-BE49-F238E27FC236}">
+                <a16:creationId xmlns:a16="http://schemas.microsoft.com/office/drawing/2014/main" id="{0CFD00C4-97BF-6846-B35A-277CFF8A9374}"/>
+              </a:ext>
+            </a:extLst>
+          </p:cNvPr>
+          <p:cNvSpPr/>
+          <p:nvPr/>
+        </p:nvSpPr>
+        <p:spPr>
+          <a:xfrm>
+            <a:off x="1606735" y="2216358"/>
+            <a:ext cx="94593" cy="94593"/>
+          </a:xfrm>
+          <a:prstGeom prst="ellipse">
+            <a:avLst/>
+          </a:prstGeom>
+          <a:ln>
+            <a:solidFill>
+              <a:schemeClr val="tx1"/>
+            </a:solidFill>
+            <a:headEnd type="none" w="med" len="med"/>
+            <a:tailEnd type="none" w="med" len="med"/>
+          </a:ln>
+        </p:spPr>
+        <p:style>
+          <a:lnRef idx="1">
+            <a:schemeClr val="accent1"/>
+          </a:lnRef>
+          <a:fillRef idx="0">
+            <a:schemeClr val="accent1"/>
+          </a:fillRef>
+          <a:effectRef idx="0">
+            <a:schemeClr val="accent1"/>
+          </a:effectRef>
+          <a:fontRef idx="minor">
+            <a:schemeClr val="tx1"/>
+          </a:fontRef>
+        </p:style>
+        <p:txBody>
+          <a:bodyPr rtlCol="0" anchor="ctr"/>
+          <a:lstStyle/>
+          <a:p>
+            <a:pPr algn="ctr"/>
+            <a:endParaRPr kumimoji="1" lang="ja-JP" altLang="en-US"/>
+          </a:p>
+        </p:txBody>
+      </p:sp>
+      <p:sp>
+        <p:nvSpPr>
+          <p:cNvPr id="46" name="テキスト ボックス 45">
+            <a:extLst>
+              <a:ext uri="{FF2B5EF4-FFF2-40B4-BE49-F238E27FC236}">
+                <a16:creationId xmlns:a16="http://schemas.microsoft.com/office/drawing/2014/main" id="{C75B9367-07C3-A74E-82EA-01EF69D20DDB}"/>
+              </a:ext>
+            </a:extLst>
+          </p:cNvPr>
+          <p:cNvSpPr txBox="1"/>
+          <p:nvPr/>
+        </p:nvSpPr>
+        <p:spPr>
+          <a:xfrm>
+            <a:off x="1655147" y="2354218"/>
+            <a:ext cx="1911101" cy="261610"/>
+          </a:xfrm>
+          <a:prstGeom prst="rect">
+            <a:avLst/>
+          </a:prstGeom>
+          <a:noFill/>
+        </p:spPr>
+        <p:txBody>
+          <a:bodyPr wrap="none" rtlCol="0">
+            <a:spAutoFit/>
+          </a:bodyPr>
+          <a:lstStyle/>
+          <a:p>
+            <a:r>
+              <a:rPr kumimoji="1" lang="en-US" altLang="ja-JP" sz="1100" dirty="0"/>
+              <a:t>TXEMP = </a:t>
+            </a:r>
+            <a:r>
+              <a:rPr kumimoji="1" lang="en-US" altLang="ja-JP" sz="1100" dirty="0" err="1"/>
+              <a:t>TXEMPbuf</a:t>
+            </a:r>
+            <a:r>
+              <a:rPr kumimoji="1" lang="en-US" altLang="ja-JP" sz="1100" dirty="0"/>
+              <a:t> and </a:t>
+            </a:r>
+            <a:r>
+              <a:rPr kumimoji="1" lang="en-US" altLang="ja-JP" sz="1100" dirty="0" err="1"/>
+              <a:t>WRn</a:t>
+            </a:r>
+            <a:r>
+              <a:rPr kumimoji="1" lang="en-US" altLang="ja-JP" sz="1100" dirty="0"/>
+              <a:t>;</a:t>
+            </a:r>
+            <a:endParaRPr kumimoji="1" lang="ja-JP" altLang="en-US" sz="1100"/>
+          </a:p>
+        </p:txBody>
+      </p:sp>
     </p:spTree>
     <p:extLst>
       <p:ext uri="{BB962C8B-B14F-4D97-AF65-F5344CB8AC3E}">
@@ -14338,8 +14491,72 @@
         </p:nvSpPr>
         <p:spPr>
           <a:xfrm>
-            <a:off x="3455648" y="979813"/>
-            <a:ext cx="1130867" cy="1451329"/>
+            <a:off x="4749449" y="3228646"/>
+            <a:ext cx="1130867" cy="1172452"/>
+          </a:xfrm>
+          <a:prstGeom prst="rect">
+            <a:avLst/>
+          </a:prstGeom>
+          <a:noFill/>
+          <a:ln>
+            <a:solidFill>
+              <a:schemeClr val="tx1"/>
+            </a:solidFill>
+          </a:ln>
+        </p:spPr>
+        <p:style>
+          <a:lnRef idx="2">
+            <a:schemeClr val="accent1">
+              <a:shade val="50000"/>
+            </a:schemeClr>
+          </a:lnRef>
+          <a:fillRef idx="1">
+            <a:schemeClr val="accent1"/>
+          </a:fillRef>
+          <a:effectRef idx="0">
+            <a:schemeClr val="accent1"/>
+          </a:effectRef>
+          <a:fontRef idx="minor">
+            <a:schemeClr val="lt1"/>
+          </a:fontRef>
+        </p:style>
+        <p:txBody>
+          <a:bodyPr rtlCol="0" anchor="t"/>
+          <a:lstStyle/>
+          <a:p>
+            <a:pPr algn="ctr"/>
+            <a:r>
+              <a:rPr kumimoji="1" lang="en-US" altLang="ja-JP" sz="800" dirty="0">
+                <a:solidFill>
+                  <a:schemeClr val="tx1"/>
+                </a:solidFill>
+              </a:rPr>
+              <a:t>I2C_MUX_PROXY</a:t>
+            </a:r>
+            <a:endParaRPr kumimoji="1" lang="ja-JP" altLang="en-US" sz="800">
+              <a:solidFill>
+                <a:schemeClr val="tx1"/>
+              </a:solidFill>
+            </a:endParaRPr>
+          </a:p>
+        </p:txBody>
+      </p:sp>
+      <p:sp>
+        <p:nvSpPr>
+          <p:cNvPr id="3" name="正方形/長方形 2">
+            <a:extLst>
+              <a:ext uri="{FF2B5EF4-FFF2-40B4-BE49-F238E27FC236}">
+                <a16:creationId xmlns:a16="http://schemas.microsoft.com/office/drawing/2014/main" id="{E80AC611-E312-9F49-8CB0-7893C5DAFED8}"/>
+              </a:ext>
+            </a:extLst>
+          </p:cNvPr>
+          <p:cNvSpPr/>
+          <p:nvPr/>
+        </p:nvSpPr>
+        <p:spPr>
+          <a:xfrm>
+            <a:off x="6576602" y="4092557"/>
+            <a:ext cx="1217953" cy="970498"/>
           </a:xfrm>
           <a:prstGeom prst="rect">
             <a:avLst/>
@@ -14382,10 +14599,90 @@
       </p:sp>
       <p:sp>
         <p:nvSpPr>
-          <p:cNvPr id="3" name="正方形/長方形 2">
-            <a:extLst>
-              <a:ext uri="{FF2B5EF4-FFF2-40B4-BE49-F238E27FC236}">
-                <a16:creationId xmlns:a16="http://schemas.microsoft.com/office/drawing/2014/main" id="{E80AC611-E312-9F49-8CB0-7893C5DAFED8}"/>
+          <p:cNvPr id="4" name="テキスト ボックス 3">
+            <a:extLst>
+              <a:ext uri="{FF2B5EF4-FFF2-40B4-BE49-F238E27FC236}">
+                <a16:creationId xmlns:a16="http://schemas.microsoft.com/office/drawing/2014/main" id="{FF67E3ED-A669-D046-AABA-0348F93D1514}"/>
+              </a:ext>
+            </a:extLst>
+          </p:cNvPr>
+          <p:cNvSpPr txBox="1"/>
+          <p:nvPr/>
+        </p:nvSpPr>
+        <p:spPr>
+          <a:xfrm>
+            <a:off x="6558365" y="4157019"/>
+            <a:ext cx="441146" cy="200055"/>
+          </a:xfrm>
+          <a:prstGeom prst="rect">
+            <a:avLst/>
+          </a:prstGeom>
+          <a:noFill/>
+        </p:spPr>
+        <p:txBody>
+          <a:bodyPr wrap="none" rtlCol="0">
+            <a:spAutoFit/>
+          </a:bodyPr>
+          <a:lstStyle/>
+          <a:p>
+            <a:r>
+              <a:rPr kumimoji="1" lang="en-US" altLang="ja-JP" sz="700" dirty="0"/>
+              <a:t>TXEMP</a:t>
+            </a:r>
+          </a:p>
+        </p:txBody>
+      </p:sp>
+      <p:cxnSp>
+        <p:nvCxnSpPr>
+          <p:cNvPr id="5" name="直線矢印コネクタ 4">
+            <a:extLst>
+              <a:ext uri="{FF2B5EF4-FFF2-40B4-BE49-F238E27FC236}">
+                <a16:creationId xmlns:a16="http://schemas.microsoft.com/office/drawing/2014/main" id="{068E6286-E542-6449-95F9-083ED417C259}"/>
+              </a:ext>
+            </a:extLst>
+          </p:cNvPr>
+          <p:cNvCxnSpPr>
+            <a:cxnSpLocks/>
+          </p:cNvCxnSpPr>
+          <p:nvPr/>
+        </p:nvCxnSpPr>
+        <p:spPr>
+          <a:xfrm>
+            <a:off x="5902405" y="4253698"/>
+            <a:ext cx="662047" cy="0"/>
+          </a:xfrm>
+          <a:prstGeom prst="straightConnector1">
+            <a:avLst/>
+          </a:prstGeom>
+          <a:ln>
+            <a:solidFill>
+              <a:schemeClr val="tx1"/>
+            </a:solidFill>
+            <a:headEnd type="none" w="med" len="med"/>
+            <a:tailEnd type="triangle" w="med" len="med"/>
+          </a:ln>
+        </p:spPr>
+        <p:style>
+          <a:lnRef idx="1">
+            <a:schemeClr val="accent1"/>
+          </a:lnRef>
+          <a:fillRef idx="0">
+            <a:schemeClr val="accent1"/>
+          </a:fillRef>
+          <a:effectRef idx="0">
+            <a:schemeClr val="accent1"/>
+          </a:effectRef>
+          <a:fontRef idx="minor">
+            <a:schemeClr val="tx1"/>
+          </a:fontRef>
+        </p:style>
+      </p:cxnSp>
+      <p:sp>
+        <p:nvSpPr>
+          <p:cNvPr id="6" name="正方形/長方形 5">
+            <a:extLst>
+              <a:ext uri="{FF2B5EF4-FFF2-40B4-BE49-F238E27FC236}">
+                <a16:creationId xmlns:a16="http://schemas.microsoft.com/office/drawing/2014/main" id="{07E44EF8-12C3-8B4F-9295-8E5708D9CCF9}"/>
               </a:ext>
             </a:extLst>
           </p:cNvPr>
@@ -14394,8 +14691,1672 @@
         </p:nvSpPr>
         <p:spPr>
           <a:xfrm>
-            <a:off x="5277191" y="849184"/>
-            <a:ext cx="1217953" cy="1509385"/>
+            <a:off x="2402498" y="2799718"/>
+            <a:ext cx="3635830" cy="3962030"/>
+          </a:xfrm>
+          <a:prstGeom prst="rect">
+            <a:avLst/>
+          </a:prstGeom>
+          <a:noFill/>
+          <a:ln>
+            <a:solidFill>
+              <a:schemeClr val="tx1"/>
+            </a:solidFill>
+          </a:ln>
+        </p:spPr>
+        <p:style>
+          <a:lnRef idx="2">
+            <a:schemeClr val="accent1">
+              <a:shade val="50000"/>
+            </a:schemeClr>
+          </a:lnRef>
+          <a:fillRef idx="1">
+            <a:schemeClr val="accent1"/>
+          </a:fillRef>
+          <a:effectRef idx="0">
+            <a:schemeClr val="accent1"/>
+          </a:effectRef>
+          <a:fontRef idx="minor">
+            <a:schemeClr val="lt1"/>
+          </a:fontRef>
+        </p:style>
+        <p:txBody>
+          <a:bodyPr rtlCol="0" anchor="t"/>
+          <a:lstStyle/>
+          <a:p>
+            <a:pPr algn="ctr"/>
+            <a:r>
+              <a:rPr kumimoji="1" lang="en-US" altLang="ja-JP" sz="1050" dirty="0">
+                <a:solidFill>
+                  <a:schemeClr val="tx1"/>
+                </a:solidFill>
+              </a:rPr>
+              <a:t>I2C_MUX</a:t>
+            </a:r>
+            <a:endParaRPr kumimoji="1" lang="ja-JP" altLang="en-US" sz="1050">
+              <a:solidFill>
+                <a:schemeClr val="tx1"/>
+              </a:solidFill>
+            </a:endParaRPr>
+          </a:p>
+        </p:txBody>
+      </p:sp>
+      <p:sp>
+        <p:nvSpPr>
+          <p:cNvPr id="7" name="正方形/長方形 6">
+            <a:extLst>
+              <a:ext uri="{FF2B5EF4-FFF2-40B4-BE49-F238E27FC236}">
+                <a16:creationId xmlns:a16="http://schemas.microsoft.com/office/drawing/2014/main" id="{7DD5E61F-723E-424D-AABC-D50ED9D1FD26}"/>
+              </a:ext>
+            </a:extLst>
+          </p:cNvPr>
+          <p:cNvSpPr/>
+          <p:nvPr/>
+        </p:nvSpPr>
+        <p:spPr>
+          <a:xfrm>
+            <a:off x="3078659" y="3436209"/>
+            <a:ext cx="1130867" cy="931229"/>
+          </a:xfrm>
+          <a:prstGeom prst="rect">
+            <a:avLst/>
+          </a:prstGeom>
+          <a:noFill/>
+          <a:ln>
+            <a:solidFill>
+              <a:schemeClr val="tx1"/>
+            </a:solidFill>
+          </a:ln>
+        </p:spPr>
+        <p:style>
+          <a:lnRef idx="2">
+            <a:schemeClr val="accent1">
+              <a:shade val="50000"/>
+            </a:schemeClr>
+          </a:lnRef>
+          <a:fillRef idx="1">
+            <a:schemeClr val="accent1"/>
+          </a:fillRef>
+          <a:effectRef idx="0">
+            <a:schemeClr val="accent1"/>
+          </a:effectRef>
+          <a:fontRef idx="minor">
+            <a:schemeClr val="lt1"/>
+          </a:fontRef>
+        </p:style>
+        <p:txBody>
+          <a:bodyPr rtlCol="0" anchor="t"/>
+          <a:lstStyle/>
+          <a:p>
+            <a:pPr algn="ctr"/>
+            <a:r>
+              <a:rPr kumimoji="1" lang="en-US" altLang="ja-JP" sz="900" dirty="0">
+                <a:solidFill>
+                  <a:schemeClr val="tx1"/>
+                </a:solidFill>
+              </a:rPr>
+              <a:t>arbiter</a:t>
+            </a:r>
+            <a:endParaRPr kumimoji="1" lang="ja-JP" altLang="en-US" sz="900">
+              <a:solidFill>
+                <a:schemeClr val="tx1"/>
+              </a:solidFill>
+            </a:endParaRPr>
+          </a:p>
+        </p:txBody>
+      </p:sp>
+      <p:cxnSp>
+        <p:nvCxnSpPr>
+          <p:cNvPr id="8" name="直線矢印コネクタ 7">
+            <a:extLst>
+              <a:ext uri="{FF2B5EF4-FFF2-40B4-BE49-F238E27FC236}">
+                <a16:creationId xmlns:a16="http://schemas.microsoft.com/office/drawing/2014/main" id="{E922A9DB-318A-5047-AF7E-7EFC5B283F21}"/>
+              </a:ext>
+            </a:extLst>
+          </p:cNvPr>
+          <p:cNvCxnSpPr>
+            <a:cxnSpLocks/>
+          </p:cNvCxnSpPr>
+          <p:nvPr/>
+        </p:nvCxnSpPr>
+        <p:spPr>
+          <a:xfrm>
+            <a:off x="4231297" y="3797779"/>
+            <a:ext cx="515257" cy="0"/>
+          </a:xfrm>
+          <a:prstGeom prst="straightConnector1">
+            <a:avLst/>
+          </a:prstGeom>
+          <a:ln>
+            <a:solidFill>
+              <a:schemeClr val="tx1"/>
+            </a:solidFill>
+            <a:headEnd type="none" w="med" len="med"/>
+            <a:tailEnd type="triangle" w="med" len="med"/>
+          </a:ln>
+        </p:spPr>
+        <p:style>
+          <a:lnRef idx="1">
+            <a:schemeClr val="accent1"/>
+          </a:lnRef>
+          <a:fillRef idx="0">
+            <a:schemeClr val="accent1"/>
+          </a:fillRef>
+          <a:effectRef idx="0">
+            <a:schemeClr val="accent1"/>
+          </a:effectRef>
+          <a:fontRef idx="minor">
+            <a:schemeClr val="tx1"/>
+          </a:fontRef>
+        </p:style>
+      </p:cxnSp>
+      <p:cxnSp>
+        <p:nvCxnSpPr>
+          <p:cNvPr id="10" name="直線矢印コネクタ 9">
+            <a:extLst>
+              <a:ext uri="{FF2B5EF4-FFF2-40B4-BE49-F238E27FC236}">
+                <a16:creationId xmlns:a16="http://schemas.microsoft.com/office/drawing/2014/main" id="{5D5E283C-330A-0948-86C4-91B5F19D75CC}"/>
+              </a:ext>
+            </a:extLst>
+          </p:cNvPr>
+          <p:cNvCxnSpPr>
+            <a:cxnSpLocks/>
+          </p:cNvCxnSpPr>
+          <p:nvPr/>
+        </p:nvCxnSpPr>
+        <p:spPr>
+          <a:xfrm flipH="1">
+            <a:off x="4202269" y="3652637"/>
+            <a:ext cx="551542" cy="0"/>
+          </a:xfrm>
+          <a:prstGeom prst="straightConnector1">
+            <a:avLst/>
+          </a:prstGeom>
+          <a:ln>
+            <a:solidFill>
+              <a:schemeClr val="tx1"/>
+            </a:solidFill>
+            <a:headEnd type="none" w="med" len="med"/>
+            <a:tailEnd type="triangle" w="med" len="med"/>
+          </a:ln>
+        </p:spPr>
+        <p:style>
+          <a:lnRef idx="1">
+            <a:schemeClr val="accent1"/>
+          </a:lnRef>
+          <a:fillRef idx="0">
+            <a:schemeClr val="accent1"/>
+          </a:fillRef>
+          <a:effectRef idx="0">
+            <a:schemeClr val="accent1"/>
+          </a:effectRef>
+          <a:fontRef idx="minor">
+            <a:schemeClr val="tx1"/>
+          </a:fontRef>
+        </p:style>
+      </p:cxnSp>
+      <p:sp>
+        <p:nvSpPr>
+          <p:cNvPr id="15" name="テキスト ボックス 14">
+            <a:extLst>
+              <a:ext uri="{FF2B5EF4-FFF2-40B4-BE49-F238E27FC236}">
+                <a16:creationId xmlns:a16="http://schemas.microsoft.com/office/drawing/2014/main" id="{00307D3D-7302-094B-BBA3-E096BD9D965A}"/>
+              </a:ext>
+            </a:extLst>
+          </p:cNvPr>
+          <p:cNvSpPr txBox="1"/>
+          <p:nvPr/>
+        </p:nvSpPr>
+        <p:spPr>
+          <a:xfrm>
+            <a:off x="4272365" y="3461614"/>
+            <a:ext cx="484428" cy="200055"/>
+          </a:xfrm>
+          <a:prstGeom prst="rect">
+            <a:avLst/>
+          </a:prstGeom>
+          <a:noFill/>
+        </p:spPr>
+        <p:txBody>
+          <a:bodyPr wrap="none" rtlCol="0">
+            <a:spAutoFit/>
+          </a:bodyPr>
+          <a:lstStyle/>
+          <a:p>
+            <a:r>
+              <a:rPr kumimoji="1" lang="en-US" altLang="ja-JP" sz="700" dirty="0"/>
+              <a:t>BUSREQ</a:t>
+            </a:r>
+          </a:p>
+        </p:txBody>
+      </p:sp>
+      <p:sp>
+        <p:nvSpPr>
+          <p:cNvPr id="16" name="テキスト ボックス 15">
+            <a:extLst>
+              <a:ext uri="{FF2B5EF4-FFF2-40B4-BE49-F238E27FC236}">
+                <a16:creationId xmlns:a16="http://schemas.microsoft.com/office/drawing/2014/main" id="{E7FE1D41-4711-F24B-A164-7200A0BE791F}"/>
+              </a:ext>
+            </a:extLst>
+          </p:cNvPr>
+          <p:cNvSpPr txBox="1"/>
+          <p:nvPr/>
+        </p:nvSpPr>
+        <p:spPr>
+          <a:xfrm>
+            <a:off x="4272365" y="3643043"/>
+            <a:ext cx="489236" cy="200055"/>
+          </a:xfrm>
+          <a:prstGeom prst="rect">
+            <a:avLst/>
+          </a:prstGeom>
+          <a:noFill/>
+        </p:spPr>
+        <p:txBody>
+          <a:bodyPr wrap="none" rtlCol="0">
+            <a:spAutoFit/>
+          </a:bodyPr>
+          <a:lstStyle/>
+          <a:p>
+            <a:r>
+              <a:rPr kumimoji="1" lang="en-US" altLang="ja-JP" sz="700" dirty="0"/>
+              <a:t>BUSGNT</a:t>
+            </a:r>
+          </a:p>
+        </p:txBody>
+      </p:sp>
+      <p:cxnSp>
+        <p:nvCxnSpPr>
+          <p:cNvPr id="17" name="直線矢印コネクタ 16">
+            <a:extLst>
+              <a:ext uri="{FF2B5EF4-FFF2-40B4-BE49-F238E27FC236}">
+                <a16:creationId xmlns:a16="http://schemas.microsoft.com/office/drawing/2014/main" id="{FB73EA04-CDB0-394A-A47B-DE3DA66B1DEB}"/>
+              </a:ext>
+            </a:extLst>
+          </p:cNvPr>
+          <p:cNvCxnSpPr>
+            <a:cxnSpLocks/>
+          </p:cNvCxnSpPr>
+          <p:nvPr/>
+        </p:nvCxnSpPr>
+        <p:spPr>
+          <a:xfrm flipH="1">
+            <a:off x="4202269" y="3979209"/>
+            <a:ext cx="551542" cy="0"/>
+          </a:xfrm>
+          <a:prstGeom prst="straightConnector1">
+            <a:avLst/>
+          </a:prstGeom>
+          <a:ln>
+            <a:solidFill>
+              <a:schemeClr val="tx1"/>
+            </a:solidFill>
+            <a:headEnd type="none" w="med" len="med"/>
+            <a:tailEnd type="triangle" w="med" len="med"/>
+          </a:ln>
+        </p:spPr>
+        <p:style>
+          <a:lnRef idx="1">
+            <a:schemeClr val="accent1"/>
+          </a:lnRef>
+          <a:fillRef idx="0">
+            <a:schemeClr val="accent1"/>
+          </a:fillRef>
+          <a:effectRef idx="0">
+            <a:schemeClr val="accent1"/>
+          </a:effectRef>
+          <a:fontRef idx="minor">
+            <a:schemeClr val="tx1"/>
+          </a:fontRef>
+        </p:style>
+      </p:cxnSp>
+      <p:sp>
+        <p:nvSpPr>
+          <p:cNvPr id="18" name="テキスト ボックス 17">
+            <a:extLst>
+              <a:ext uri="{FF2B5EF4-FFF2-40B4-BE49-F238E27FC236}">
+                <a16:creationId xmlns:a16="http://schemas.microsoft.com/office/drawing/2014/main" id="{D16376C0-2767-7940-8FDB-9F4684C4FF84}"/>
+              </a:ext>
+            </a:extLst>
+          </p:cNvPr>
+          <p:cNvSpPr txBox="1"/>
+          <p:nvPr/>
+        </p:nvSpPr>
+        <p:spPr>
+          <a:xfrm>
+            <a:off x="4279622" y="3809958"/>
+            <a:ext cx="478016" cy="200055"/>
+          </a:xfrm>
+          <a:prstGeom prst="rect">
+            <a:avLst/>
+          </a:prstGeom>
+          <a:noFill/>
+        </p:spPr>
+        <p:txBody>
+          <a:bodyPr wrap="none" rtlCol="0">
+            <a:spAutoFit/>
+          </a:bodyPr>
+          <a:lstStyle/>
+          <a:p>
+            <a:r>
+              <a:rPr kumimoji="1" lang="en-US" altLang="ja-JP" sz="700" dirty="0"/>
+              <a:t>BUSACK</a:t>
+            </a:r>
+          </a:p>
+        </p:txBody>
+      </p:sp>
+      <p:sp>
+        <p:nvSpPr>
+          <p:cNvPr id="19" name="円/楕円 18">
+            <a:extLst>
+              <a:ext uri="{FF2B5EF4-FFF2-40B4-BE49-F238E27FC236}">
+                <a16:creationId xmlns:a16="http://schemas.microsoft.com/office/drawing/2014/main" id="{A919DBC7-CE18-6E49-963B-E56C419C0696}"/>
+              </a:ext>
+            </a:extLst>
+          </p:cNvPr>
+          <p:cNvSpPr/>
+          <p:nvPr/>
+        </p:nvSpPr>
+        <p:spPr>
+          <a:xfrm>
+            <a:off x="5231892" y="3456893"/>
+            <a:ext cx="251963" cy="241465"/>
+          </a:xfrm>
+          <a:prstGeom prst="ellipse">
+            <a:avLst/>
+          </a:prstGeom>
+          <a:ln>
+            <a:solidFill>
+              <a:schemeClr val="tx1"/>
+            </a:solidFill>
+            <a:headEnd type="none" w="med" len="med"/>
+            <a:tailEnd type="none" w="med" len="med"/>
+          </a:ln>
+        </p:spPr>
+        <p:style>
+          <a:lnRef idx="1">
+            <a:schemeClr val="accent1"/>
+          </a:lnRef>
+          <a:fillRef idx="0">
+            <a:schemeClr val="accent1"/>
+          </a:fillRef>
+          <a:effectRef idx="0">
+            <a:schemeClr val="accent1"/>
+          </a:effectRef>
+          <a:fontRef idx="minor">
+            <a:schemeClr val="tx1"/>
+          </a:fontRef>
+        </p:style>
+        <p:txBody>
+          <a:bodyPr wrap="none" rtlCol="0" anchor="ctr"/>
+          <a:lstStyle/>
+          <a:p>
+            <a:pPr algn="ctr"/>
+            <a:r>
+              <a:rPr kumimoji="1" lang="en-US" altLang="ja-JP" sz="700" dirty="0"/>
+              <a:t>IDLE</a:t>
+            </a:r>
+            <a:endParaRPr kumimoji="1" lang="ja-JP" altLang="en-US" sz="700"/>
+          </a:p>
+        </p:txBody>
+      </p:sp>
+      <p:sp>
+        <p:nvSpPr>
+          <p:cNvPr id="20" name="円/楕円 19">
+            <a:extLst>
+              <a:ext uri="{FF2B5EF4-FFF2-40B4-BE49-F238E27FC236}">
+                <a16:creationId xmlns:a16="http://schemas.microsoft.com/office/drawing/2014/main" id="{F9493EE6-F0F4-0746-8FF6-CA091D3B3849}"/>
+              </a:ext>
+            </a:extLst>
+          </p:cNvPr>
+          <p:cNvSpPr/>
+          <p:nvPr/>
+        </p:nvSpPr>
+        <p:spPr>
+          <a:xfrm>
+            <a:off x="5558393" y="3664088"/>
+            <a:ext cx="251963" cy="241465"/>
+          </a:xfrm>
+          <a:prstGeom prst="ellipse">
+            <a:avLst/>
+          </a:prstGeom>
+          <a:ln>
+            <a:solidFill>
+              <a:schemeClr val="tx1"/>
+            </a:solidFill>
+            <a:headEnd type="none" w="med" len="med"/>
+            <a:tailEnd type="none" w="med" len="med"/>
+          </a:ln>
+        </p:spPr>
+        <p:style>
+          <a:lnRef idx="1">
+            <a:schemeClr val="accent1"/>
+          </a:lnRef>
+          <a:fillRef idx="0">
+            <a:schemeClr val="accent1"/>
+          </a:fillRef>
+          <a:effectRef idx="0">
+            <a:schemeClr val="accent1"/>
+          </a:effectRef>
+          <a:fontRef idx="minor">
+            <a:schemeClr val="tx1"/>
+          </a:fontRef>
+        </p:style>
+        <p:txBody>
+          <a:bodyPr wrap="none" rtlCol="0" anchor="ctr"/>
+          <a:lstStyle/>
+          <a:p>
+            <a:pPr algn="ctr"/>
+            <a:r>
+              <a:rPr kumimoji="1" lang="en-US" altLang="ja-JP" sz="700" dirty="0"/>
+              <a:t>REQ</a:t>
+            </a:r>
+            <a:endParaRPr kumimoji="1" lang="ja-JP" altLang="en-US" sz="700"/>
+          </a:p>
+        </p:txBody>
+      </p:sp>
+      <p:sp>
+        <p:nvSpPr>
+          <p:cNvPr id="21" name="円/楕円 20">
+            <a:extLst>
+              <a:ext uri="{FF2B5EF4-FFF2-40B4-BE49-F238E27FC236}">
+                <a16:creationId xmlns:a16="http://schemas.microsoft.com/office/drawing/2014/main" id="{4813BEFE-248F-4F41-861B-807CD38D9632}"/>
+              </a:ext>
+            </a:extLst>
+          </p:cNvPr>
+          <p:cNvSpPr/>
+          <p:nvPr/>
+        </p:nvSpPr>
+        <p:spPr>
+          <a:xfrm>
+            <a:off x="5231892" y="3890797"/>
+            <a:ext cx="251963" cy="241465"/>
+          </a:xfrm>
+          <a:prstGeom prst="ellipse">
+            <a:avLst/>
+          </a:prstGeom>
+          <a:ln>
+            <a:solidFill>
+              <a:schemeClr val="tx1"/>
+            </a:solidFill>
+            <a:headEnd type="none" w="med" len="med"/>
+            <a:tailEnd type="none" w="med" len="med"/>
+          </a:ln>
+        </p:spPr>
+        <p:style>
+          <a:lnRef idx="1">
+            <a:schemeClr val="accent1"/>
+          </a:lnRef>
+          <a:fillRef idx="0">
+            <a:schemeClr val="accent1"/>
+          </a:fillRef>
+          <a:effectRef idx="0">
+            <a:schemeClr val="accent1"/>
+          </a:effectRef>
+          <a:fontRef idx="minor">
+            <a:schemeClr val="tx1"/>
+          </a:fontRef>
+        </p:style>
+        <p:txBody>
+          <a:bodyPr wrap="none" rtlCol="0" anchor="ctr"/>
+          <a:lstStyle/>
+          <a:p>
+            <a:pPr algn="ctr"/>
+            <a:r>
+              <a:rPr kumimoji="1" lang="en-US" altLang="ja-JP" sz="700" dirty="0"/>
+              <a:t>BUSY</a:t>
+            </a:r>
+            <a:endParaRPr kumimoji="1" lang="ja-JP" altLang="en-US" sz="700"/>
+          </a:p>
+        </p:txBody>
+      </p:sp>
+      <p:sp>
+        <p:nvSpPr>
+          <p:cNvPr id="22" name="テキスト ボックス 21">
+            <a:extLst>
+              <a:ext uri="{FF2B5EF4-FFF2-40B4-BE49-F238E27FC236}">
+                <a16:creationId xmlns:a16="http://schemas.microsoft.com/office/drawing/2014/main" id="{93FF2424-173B-1D4E-A126-C08FD292A841}"/>
+              </a:ext>
+            </a:extLst>
+          </p:cNvPr>
+          <p:cNvSpPr txBox="1"/>
+          <p:nvPr/>
+        </p:nvSpPr>
+        <p:spPr>
+          <a:xfrm>
+            <a:off x="5065393" y="455054"/>
+            <a:ext cx="3934230" cy="2462213"/>
+          </a:xfrm>
+          <a:prstGeom prst="rect">
+            <a:avLst/>
+          </a:prstGeom>
+          <a:noFill/>
+        </p:spPr>
+        <p:txBody>
+          <a:bodyPr wrap="square" rtlCol="0">
+            <a:spAutoFit/>
+          </a:bodyPr>
+          <a:lstStyle/>
+          <a:p>
+            <a:pPr marL="285750" indent="-285750">
+              <a:buFont typeface="Arial" panose="020B0604020202020204" pitchFamily="34" charset="0"/>
+              <a:buChar char="•"/>
+            </a:pPr>
+            <a:r>
+              <a:rPr kumimoji="1" lang="en-US" altLang="ja-JP" sz="1100" dirty="0"/>
+              <a:t>IDLE</a:t>
+            </a:r>
+          </a:p>
+          <a:p>
+            <a:pPr marL="742950" lvl="1" indent="-285750">
+              <a:buFont typeface="Arial" panose="020B0604020202020204" pitchFamily="34" charset="0"/>
+              <a:buChar char="•"/>
+            </a:pPr>
+            <a:r>
+              <a:rPr kumimoji="1" lang="en-US" altLang="ja-JP" sz="1100" dirty="0"/>
+              <a:t>TXEMP</a:t>
+            </a:r>
+            <a:r>
+              <a:rPr kumimoji="1" lang="ja-JP" altLang="en-US" sz="1100"/>
+              <a:t>は</a:t>
+            </a:r>
+            <a:r>
+              <a:rPr kumimoji="1" lang="en-US" altLang="ja-JP" sz="1100" dirty="0"/>
+              <a:t>’1’</a:t>
+            </a:r>
+          </a:p>
+          <a:p>
+            <a:pPr marL="742950" lvl="1" indent="-285750">
+              <a:buFont typeface="Arial" panose="020B0604020202020204" pitchFamily="34" charset="0"/>
+              <a:buChar char="•"/>
+            </a:pPr>
+            <a:r>
+              <a:rPr kumimoji="1" lang="en-US" altLang="ja-JP" sz="1100" dirty="0" err="1"/>
+              <a:t>WRn</a:t>
+            </a:r>
+            <a:r>
+              <a:rPr kumimoji="1" lang="ja-JP" altLang="en-US" sz="1100"/>
+              <a:t>と</a:t>
+            </a:r>
+            <a:r>
+              <a:rPr kumimoji="1" lang="en-US" altLang="ja-JP" sz="1100" dirty="0"/>
+              <a:t>START</a:t>
+            </a:r>
+            <a:r>
+              <a:rPr kumimoji="1" lang="ja-JP" altLang="en-US" sz="1100"/>
+              <a:t>がアクティブになったら</a:t>
+            </a:r>
+            <a:r>
+              <a:rPr kumimoji="1" lang="en-US" altLang="ja-JP" sz="1100" dirty="0"/>
+              <a:t>REQ</a:t>
+            </a:r>
+            <a:r>
+              <a:rPr kumimoji="1" lang="ja-JP" altLang="en-US" sz="1100"/>
+              <a:t>に遷移</a:t>
+            </a:r>
+            <a:endParaRPr kumimoji="1" lang="en-US" altLang="ja-JP" sz="1100" dirty="0"/>
+          </a:p>
+          <a:p>
+            <a:pPr marL="285750" indent="-285750">
+              <a:buFont typeface="Arial" panose="020B0604020202020204" pitchFamily="34" charset="0"/>
+              <a:buChar char="•"/>
+            </a:pPr>
+            <a:r>
+              <a:rPr kumimoji="1" lang="en-US" altLang="ja-JP" sz="1100" dirty="0"/>
+              <a:t>REQ</a:t>
+            </a:r>
+          </a:p>
+          <a:p>
+            <a:pPr marL="742950" lvl="1" indent="-285750">
+              <a:buFont typeface="Arial" panose="020B0604020202020204" pitchFamily="34" charset="0"/>
+              <a:buChar char="•"/>
+            </a:pPr>
+            <a:r>
+              <a:rPr kumimoji="1" lang="en-US" altLang="ja-JP" sz="1100" dirty="0"/>
+              <a:t>TXEMP</a:t>
+            </a:r>
+            <a:r>
+              <a:rPr kumimoji="1" lang="ja-JP" altLang="en-US" sz="1100"/>
+              <a:t>は</a:t>
+            </a:r>
+            <a:r>
+              <a:rPr kumimoji="1" lang="en-US" altLang="ja-JP" sz="1100" dirty="0"/>
+              <a:t>’0’</a:t>
+            </a:r>
+          </a:p>
+          <a:p>
+            <a:pPr marL="742950" lvl="1" indent="-285750">
+              <a:buFont typeface="Arial" panose="020B0604020202020204" pitchFamily="34" charset="0"/>
+              <a:buChar char="•"/>
+            </a:pPr>
+            <a:r>
+              <a:rPr kumimoji="1" lang="ja-JP" altLang="en-US" sz="1100"/>
+              <a:t>この間に</a:t>
+            </a:r>
+            <a:r>
+              <a:rPr kumimoji="1" lang="en-US" altLang="ja-JP" sz="1100" dirty="0"/>
+              <a:t>BUSREQ</a:t>
+            </a:r>
+            <a:r>
+              <a:rPr kumimoji="1" lang="ja-JP" altLang="en-US" sz="1100"/>
+              <a:t>を出して</a:t>
+            </a:r>
+            <a:r>
+              <a:rPr kumimoji="1" lang="en-US" altLang="ja-JP" sz="1100" dirty="0"/>
+              <a:t>BUSGNT</a:t>
+            </a:r>
+            <a:r>
+              <a:rPr kumimoji="1" lang="ja-JP" altLang="en-US" sz="1100"/>
+              <a:t>がアクティブになるのを待つ</a:t>
+            </a:r>
+            <a:endParaRPr kumimoji="1" lang="en-US" altLang="ja-JP" sz="1100" dirty="0"/>
+          </a:p>
+          <a:p>
+            <a:pPr marL="285750" indent="-285750">
+              <a:buFont typeface="Arial" panose="020B0604020202020204" pitchFamily="34" charset="0"/>
+              <a:buChar char="•"/>
+            </a:pPr>
+            <a:r>
+              <a:rPr kumimoji="1" lang="en-US" altLang="ja-JP" sz="1100" dirty="0"/>
+              <a:t>BUSY</a:t>
+            </a:r>
+          </a:p>
+          <a:p>
+            <a:pPr marL="742950" lvl="1" indent="-285750">
+              <a:buFont typeface="Arial" panose="020B0604020202020204" pitchFamily="34" charset="0"/>
+              <a:buChar char="•"/>
+            </a:pPr>
+            <a:r>
+              <a:rPr kumimoji="1" lang="en-US" altLang="ja-JP" sz="1100" dirty="0"/>
+              <a:t>TXEMP</a:t>
+            </a:r>
+            <a:r>
+              <a:rPr kumimoji="1" lang="ja-JP" altLang="en-US" sz="1100"/>
+              <a:t>は</a:t>
+            </a:r>
+            <a:r>
+              <a:rPr kumimoji="1" lang="en-US" altLang="ja-JP" sz="1100" dirty="0"/>
+              <a:t>TXEMP_ORG</a:t>
+            </a:r>
+            <a:r>
+              <a:rPr kumimoji="1" lang="ja-JP" altLang="en-US" sz="1100"/>
+              <a:t>がスルーされる</a:t>
+            </a:r>
+            <a:endParaRPr kumimoji="1" lang="en-US" altLang="ja-JP" sz="1100" dirty="0"/>
+          </a:p>
+          <a:p>
+            <a:pPr marL="742950" lvl="1" indent="-285750">
+              <a:buFont typeface="Arial" panose="020B0604020202020204" pitchFamily="34" charset="0"/>
+              <a:buChar char="•"/>
+            </a:pPr>
+            <a:r>
+              <a:rPr kumimoji="1" lang="ja-JP" altLang="en-US" sz="1100"/>
+              <a:t>この間はずっと</a:t>
+            </a:r>
+            <a:r>
+              <a:rPr kumimoji="1" lang="en-US" altLang="ja-JP" sz="1100" dirty="0"/>
+              <a:t>BUSACK</a:t>
+            </a:r>
+            <a:r>
+              <a:rPr kumimoji="1" lang="ja-JP" altLang="en-US" sz="1100"/>
+              <a:t>をアクティブにしておくとバスが占有できる</a:t>
+            </a:r>
+            <a:endParaRPr kumimoji="1" lang="en-US" altLang="ja-JP" sz="1100" dirty="0"/>
+          </a:p>
+          <a:p>
+            <a:pPr marL="285750" indent="-285750">
+              <a:buFont typeface="Arial" panose="020B0604020202020204" pitchFamily="34" charset="0"/>
+              <a:buChar char="•"/>
+            </a:pPr>
+            <a:r>
+              <a:rPr kumimoji="1" lang="en-US" altLang="ja-JP" sz="1100" dirty="0"/>
+              <a:t>FIN</a:t>
+            </a:r>
+          </a:p>
+          <a:p>
+            <a:pPr marL="742950" lvl="1" indent="-285750">
+              <a:buFont typeface="Arial" panose="020B0604020202020204" pitchFamily="34" charset="0"/>
+              <a:buChar char="•"/>
+            </a:pPr>
+            <a:r>
+              <a:rPr kumimoji="1" lang="ja-JP" altLang="en-US" sz="1100"/>
+              <a:t>バス解放完了待ち</a:t>
+            </a:r>
+            <a:endParaRPr kumimoji="1" lang="en-US" altLang="ja-JP" sz="1100" dirty="0"/>
+          </a:p>
+          <a:p>
+            <a:pPr marL="285750" indent="-285750">
+              <a:buFont typeface="Arial" panose="020B0604020202020204" pitchFamily="34" charset="0"/>
+              <a:buChar char="•"/>
+            </a:pPr>
+            <a:endParaRPr kumimoji="1" lang="en-US" altLang="ja-JP" sz="1100" dirty="0"/>
+          </a:p>
+        </p:txBody>
+      </p:sp>
+      <p:sp>
+        <p:nvSpPr>
+          <p:cNvPr id="23" name="テキスト ボックス 22">
+            <a:extLst>
+              <a:ext uri="{FF2B5EF4-FFF2-40B4-BE49-F238E27FC236}">
+                <a16:creationId xmlns:a16="http://schemas.microsoft.com/office/drawing/2014/main" id="{12A8B1D2-0E21-8B40-AC3F-78E71F78E1A9}"/>
+              </a:ext>
+            </a:extLst>
+          </p:cNvPr>
+          <p:cNvSpPr txBox="1"/>
+          <p:nvPr/>
+        </p:nvSpPr>
+        <p:spPr>
+          <a:xfrm>
+            <a:off x="2392766" y="3547587"/>
+            <a:ext cx="649537" cy="200055"/>
+          </a:xfrm>
+          <a:prstGeom prst="rect">
+            <a:avLst/>
+          </a:prstGeom>
+          <a:noFill/>
+        </p:spPr>
+        <p:txBody>
+          <a:bodyPr wrap="none" rtlCol="0">
+            <a:spAutoFit/>
+          </a:bodyPr>
+          <a:lstStyle/>
+          <a:p>
+            <a:r>
+              <a:rPr kumimoji="1" lang="en-US" altLang="ja-JP" sz="700" dirty="0"/>
+              <a:t>TXEMP_ORG</a:t>
+            </a:r>
+          </a:p>
+        </p:txBody>
+      </p:sp>
+      <p:cxnSp>
+        <p:nvCxnSpPr>
+          <p:cNvPr id="24" name="直線矢印コネクタ 23">
+            <a:extLst>
+              <a:ext uri="{FF2B5EF4-FFF2-40B4-BE49-F238E27FC236}">
+                <a16:creationId xmlns:a16="http://schemas.microsoft.com/office/drawing/2014/main" id="{84FA146F-3173-BF4D-94B5-9D1B81FF63BD}"/>
+              </a:ext>
+            </a:extLst>
+          </p:cNvPr>
+          <p:cNvCxnSpPr>
+            <a:cxnSpLocks/>
+          </p:cNvCxnSpPr>
+          <p:nvPr/>
+        </p:nvCxnSpPr>
+        <p:spPr>
+          <a:xfrm>
+            <a:off x="1736806" y="3644266"/>
+            <a:ext cx="662047" cy="0"/>
+          </a:xfrm>
+          <a:prstGeom prst="straightConnector1">
+            <a:avLst/>
+          </a:prstGeom>
+          <a:ln>
+            <a:solidFill>
+              <a:schemeClr val="tx1"/>
+            </a:solidFill>
+            <a:headEnd type="none" w="med" len="med"/>
+            <a:tailEnd type="triangle" w="med" len="med"/>
+          </a:ln>
+        </p:spPr>
+        <p:style>
+          <a:lnRef idx="1">
+            <a:schemeClr val="accent1"/>
+          </a:lnRef>
+          <a:fillRef idx="0">
+            <a:schemeClr val="accent1"/>
+          </a:fillRef>
+          <a:effectRef idx="0">
+            <a:schemeClr val="accent1"/>
+          </a:effectRef>
+          <a:fontRef idx="minor">
+            <a:schemeClr val="tx1"/>
+          </a:fontRef>
+        </p:style>
+      </p:cxnSp>
+      <p:sp>
+        <p:nvSpPr>
+          <p:cNvPr id="29" name="テキスト ボックス 28">
+            <a:extLst>
+              <a:ext uri="{FF2B5EF4-FFF2-40B4-BE49-F238E27FC236}">
+                <a16:creationId xmlns:a16="http://schemas.microsoft.com/office/drawing/2014/main" id="{43E9A9B6-8D04-EC4E-B50D-9DF742914691}"/>
+              </a:ext>
+            </a:extLst>
+          </p:cNvPr>
+          <p:cNvSpPr txBox="1"/>
+          <p:nvPr/>
+        </p:nvSpPr>
+        <p:spPr>
+          <a:xfrm>
+            <a:off x="5316044" y="4134148"/>
+            <a:ext cx="622286" cy="200055"/>
+          </a:xfrm>
+          <a:prstGeom prst="rect">
+            <a:avLst/>
+          </a:prstGeom>
+          <a:noFill/>
+        </p:spPr>
+        <p:txBody>
+          <a:bodyPr wrap="none" rtlCol="0">
+            <a:spAutoFit/>
+          </a:bodyPr>
+          <a:lstStyle/>
+          <a:p>
+            <a:r>
+              <a:rPr kumimoji="1" lang="en-US" altLang="ja-JP" sz="700" dirty="0"/>
+              <a:t>TXEMP_PXY</a:t>
+            </a:r>
+          </a:p>
+        </p:txBody>
+      </p:sp>
+      <p:sp>
+        <p:nvSpPr>
+          <p:cNvPr id="30" name="テキスト ボックス 29">
+            <a:extLst>
+              <a:ext uri="{FF2B5EF4-FFF2-40B4-BE49-F238E27FC236}">
+                <a16:creationId xmlns:a16="http://schemas.microsoft.com/office/drawing/2014/main" id="{225890CF-F3C6-DC45-BD5D-D4D992ED170F}"/>
+              </a:ext>
+            </a:extLst>
+          </p:cNvPr>
+          <p:cNvSpPr txBox="1"/>
+          <p:nvPr/>
+        </p:nvSpPr>
+        <p:spPr>
+          <a:xfrm>
+            <a:off x="4277486" y="4019986"/>
+            <a:ext cx="441146" cy="200055"/>
+          </a:xfrm>
+          <a:prstGeom prst="rect">
+            <a:avLst/>
+          </a:prstGeom>
+          <a:noFill/>
+        </p:spPr>
+        <p:txBody>
+          <a:bodyPr wrap="none" rtlCol="0">
+            <a:spAutoFit/>
+          </a:bodyPr>
+          <a:lstStyle/>
+          <a:p>
+            <a:r>
+              <a:rPr kumimoji="1" lang="en-US" altLang="ja-JP" sz="700" dirty="0"/>
+              <a:t>TXEMP</a:t>
+            </a:r>
+          </a:p>
+        </p:txBody>
+      </p:sp>
+      <p:cxnSp>
+        <p:nvCxnSpPr>
+          <p:cNvPr id="31" name="直線矢印コネクタ 30">
+            <a:extLst>
+              <a:ext uri="{FF2B5EF4-FFF2-40B4-BE49-F238E27FC236}">
+                <a16:creationId xmlns:a16="http://schemas.microsoft.com/office/drawing/2014/main" id="{BA2D12AD-2D00-9149-AECB-48C7C444A8ED}"/>
+              </a:ext>
+            </a:extLst>
+          </p:cNvPr>
+          <p:cNvCxnSpPr>
+            <a:cxnSpLocks/>
+          </p:cNvCxnSpPr>
+          <p:nvPr/>
+        </p:nvCxnSpPr>
+        <p:spPr>
+          <a:xfrm>
+            <a:off x="4210636" y="4237050"/>
+            <a:ext cx="531222" cy="0"/>
+          </a:xfrm>
+          <a:prstGeom prst="straightConnector1">
+            <a:avLst/>
+          </a:prstGeom>
+          <a:ln>
+            <a:solidFill>
+              <a:schemeClr val="tx1"/>
+            </a:solidFill>
+            <a:headEnd type="none" w="med" len="med"/>
+            <a:tailEnd type="triangle" w="med" len="med"/>
+          </a:ln>
+        </p:spPr>
+        <p:style>
+          <a:lnRef idx="1">
+            <a:schemeClr val="accent1"/>
+          </a:lnRef>
+          <a:fillRef idx="0">
+            <a:schemeClr val="accent1"/>
+          </a:fillRef>
+          <a:effectRef idx="0">
+            <a:schemeClr val="accent1"/>
+          </a:effectRef>
+          <a:fontRef idx="minor">
+            <a:schemeClr val="tx1"/>
+          </a:fontRef>
+        </p:style>
+      </p:cxnSp>
+      <p:cxnSp>
+        <p:nvCxnSpPr>
+          <p:cNvPr id="33" name="カギ線コネクタ 32">
+            <a:extLst>
+              <a:ext uri="{FF2B5EF4-FFF2-40B4-BE49-F238E27FC236}">
+                <a16:creationId xmlns:a16="http://schemas.microsoft.com/office/drawing/2014/main" id="{F670E828-7C0F-A440-A7AC-B78C93369282}"/>
+              </a:ext>
+            </a:extLst>
+          </p:cNvPr>
+          <p:cNvCxnSpPr>
+            <a:cxnSpLocks/>
+            <a:stCxn id="19" idx="6"/>
+            <a:endCxn id="20" idx="0"/>
+          </p:cNvCxnSpPr>
+          <p:nvPr/>
+        </p:nvCxnSpPr>
+        <p:spPr>
+          <a:xfrm>
+            <a:off x="5483855" y="3577626"/>
+            <a:ext cx="200520" cy="86462"/>
+          </a:xfrm>
+          <a:prstGeom prst="curvedConnector2">
+            <a:avLst/>
+          </a:prstGeom>
+          <a:ln>
+            <a:solidFill>
+              <a:schemeClr val="tx1"/>
+            </a:solidFill>
+            <a:tailEnd type="triangle"/>
+          </a:ln>
+        </p:spPr>
+        <p:style>
+          <a:lnRef idx="1">
+            <a:schemeClr val="accent1"/>
+          </a:lnRef>
+          <a:fillRef idx="0">
+            <a:schemeClr val="accent1"/>
+          </a:fillRef>
+          <a:effectRef idx="0">
+            <a:schemeClr val="accent1"/>
+          </a:effectRef>
+          <a:fontRef idx="minor">
+            <a:schemeClr val="tx1"/>
+          </a:fontRef>
+        </p:style>
+      </p:cxnSp>
+      <p:cxnSp>
+        <p:nvCxnSpPr>
+          <p:cNvPr id="35" name="カギ線コネクタ 32">
+            <a:extLst>
+              <a:ext uri="{FF2B5EF4-FFF2-40B4-BE49-F238E27FC236}">
+                <a16:creationId xmlns:a16="http://schemas.microsoft.com/office/drawing/2014/main" id="{C3693E3B-F487-2C4F-9E77-9D8B8444E29D}"/>
+              </a:ext>
+            </a:extLst>
+          </p:cNvPr>
+          <p:cNvCxnSpPr>
+            <a:cxnSpLocks/>
+            <a:stCxn id="20" idx="4"/>
+            <a:endCxn id="21" idx="6"/>
+          </p:cNvCxnSpPr>
+          <p:nvPr/>
+        </p:nvCxnSpPr>
+        <p:spPr>
+          <a:xfrm rot="5400000">
+            <a:off x="5531127" y="3858281"/>
+            <a:ext cx="105977" cy="200520"/>
+          </a:xfrm>
+          <a:prstGeom prst="curvedConnector2">
+            <a:avLst/>
+          </a:prstGeom>
+          <a:ln>
+            <a:solidFill>
+              <a:schemeClr val="tx1"/>
+            </a:solidFill>
+            <a:tailEnd type="triangle"/>
+          </a:ln>
+        </p:spPr>
+        <p:style>
+          <a:lnRef idx="1">
+            <a:schemeClr val="accent1"/>
+          </a:lnRef>
+          <a:fillRef idx="0">
+            <a:schemeClr val="accent1"/>
+          </a:fillRef>
+          <a:effectRef idx="0">
+            <a:schemeClr val="accent1"/>
+          </a:effectRef>
+          <a:fontRef idx="minor">
+            <a:schemeClr val="tx1"/>
+          </a:fontRef>
+        </p:style>
+      </p:cxnSp>
+      <p:cxnSp>
+        <p:nvCxnSpPr>
+          <p:cNvPr id="39" name="カギ線コネクタ 32">
+            <a:extLst>
+              <a:ext uri="{FF2B5EF4-FFF2-40B4-BE49-F238E27FC236}">
+                <a16:creationId xmlns:a16="http://schemas.microsoft.com/office/drawing/2014/main" id="{6CAE17B8-E68A-2F48-A28C-C9434050CAA0}"/>
+              </a:ext>
+            </a:extLst>
+          </p:cNvPr>
+          <p:cNvCxnSpPr>
+            <a:cxnSpLocks/>
+            <a:stCxn id="21" idx="2"/>
+            <a:endCxn id="110" idx="4"/>
+          </p:cNvCxnSpPr>
+          <p:nvPr/>
+        </p:nvCxnSpPr>
+        <p:spPr>
+          <a:xfrm rot="10800000">
+            <a:off x="5039052" y="3914416"/>
+            <a:ext cx="192841" cy="97114"/>
+          </a:xfrm>
+          <a:prstGeom prst="curvedConnector2">
+            <a:avLst/>
+          </a:prstGeom>
+          <a:ln>
+            <a:solidFill>
+              <a:schemeClr val="tx1"/>
+            </a:solidFill>
+            <a:tailEnd type="triangle"/>
+          </a:ln>
+        </p:spPr>
+        <p:style>
+          <a:lnRef idx="1">
+            <a:schemeClr val="accent1"/>
+          </a:lnRef>
+          <a:fillRef idx="0">
+            <a:schemeClr val="accent1"/>
+          </a:fillRef>
+          <a:effectRef idx="0">
+            <a:schemeClr val="accent1"/>
+          </a:effectRef>
+          <a:fontRef idx="minor">
+            <a:schemeClr val="tx1"/>
+          </a:fontRef>
+        </p:style>
+      </p:cxnSp>
+      <p:sp>
+        <p:nvSpPr>
+          <p:cNvPr id="47" name="左矢印 46">
+            <a:extLst>
+              <a:ext uri="{FF2B5EF4-FFF2-40B4-BE49-F238E27FC236}">
+                <a16:creationId xmlns:a16="http://schemas.microsoft.com/office/drawing/2014/main" id="{836EA150-8B0D-6A45-849F-6E6EC4195AC4}"/>
+              </a:ext>
+            </a:extLst>
+          </p:cNvPr>
+          <p:cNvSpPr/>
+          <p:nvPr/>
+        </p:nvSpPr>
+        <p:spPr>
+          <a:xfrm>
+            <a:off x="3941634" y="4546952"/>
+            <a:ext cx="2602955" cy="240287"/>
+          </a:xfrm>
+          <a:prstGeom prst="leftArrow">
+            <a:avLst/>
+          </a:prstGeom>
+          <a:solidFill>
+            <a:schemeClr val="bg1"/>
+          </a:solidFill>
+          <a:ln>
+            <a:solidFill>
+              <a:schemeClr val="tx1"/>
+            </a:solidFill>
+            <a:headEnd type="none" w="med" len="med"/>
+            <a:tailEnd type="none" w="med" len="med"/>
+          </a:ln>
+        </p:spPr>
+        <p:style>
+          <a:lnRef idx="1">
+            <a:schemeClr val="accent1"/>
+          </a:lnRef>
+          <a:fillRef idx="0">
+            <a:schemeClr val="accent1"/>
+          </a:fillRef>
+          <a:effectRef idx="0">
+            <a:schemeClr val="accent1"/>
+          </a:effectRef>
+          <a:fontRef idx="minor">
+            <a:schemeClr val="tx1"/>
+          </a:fontRef>
+        </p:style>
+        <p:txBody>
+          <a:bodyPr rtlCol="0" anchor="ctr"/>
+          <a:lstStyle/>
+          <a:p>
+            <a:pPr algn="ctr"/>
+            <a:endParaRPr kumimoji="1" lang="ja-JP" altLang="en-US"/>
+          </a:p>
+        </p:txBody>
+      </p:sp>
+      <p:sp>
+        <p:nvSpPr>
+          <p:cNvPr id="48" name="右矢印 47">
+            <a:extLst>
+              <a:ext uri="{FF2B5EF4-FFF2-40B4-BE49-F238E27FC236}">
+                <a16:creationId xmlns:a16="http://schemas.microsoft.com/office/drawing/2014/main" id="{D15AFD04-C41B-664F-81C5-691853AE84BE}"/>
+              </a:ext>
+            </a:extLst>
+          </p:cNvPr>
+          <p:cNvSpPr/>
+          <p:nvPr/>
+        </p:nvSpPr>
+        <p:spPr>
+          <a:xfrm>
+            <a:off x="3936025" y="4777889"/>
+            <a:ext cx="2609500" cy="240287"/>
+          </a:xfrm>
+          <a:prstGeom prst="rightArrow">
+            <a:avLst/>
+          </a:prstGeom>
+          <a:solidFill>
+            <a:schemeClr val="bg1"/>
+          </a:solidFill>
+          <a:ln>
+            <a:solidFill>
+              <a:schemeClr val="tx1"/>
+            </a:solidFill>
+            <a:headEnd type="none" w="med" len="med"/>
+            <a:tailEnd type="none" w="med" len="med"/>
+          </a:ln>
+        </p:spPr>
+        <p:style>
+          <a:lnRef idx="1">
+            <a:schemeClr val="accent1"/>
+          </a:lnRef>
+          <a:fillRef idx="0">
+            <a:schemeClr val="accent1"/>
+          </a:fillRef>
+          <a:effectRef idx="0">
+            <a:schemeClr val="accent1"/>
+          </a:effectRef>
+          <a:fontRef idx="minor">
+            <a:schemeClr val="tx1"/>
+          </a:fontRef>
+        </p:style>
+        <p:txBody>
+          <a:bodyPr rtlCol="0" anchor="ctr"/>
+          <a:lstStyle/>
+          <a:p>
+            <a:pPr algn="ctr"/>
+            <a:endParaRPr kumimoji="1" lang="ja-JP" altLang="en-US"/>
+          </a:p>
+        </p:txBody>
+      </p:sp>
+      <p:grpSp>
+        <p:nvGrpSpPr>
+          <p:cNvPr id="49" name="グループ化 48">
+            <a:extLst>
+              <a:ext uri="{FF2B5EF4-FFF2-40B4-BE49-F238E27FC236}">
+                <a16:creationId xmlns:a16="http://schemas.microsoft.com/office/drawing/2014/main" id="{D8651053-DA4C-E348-89B1-172DF252854F}"/>
+              </a:ext>
+            </a:extLst>
+          </p:cNvPr>
+          <p:cNvGrpSpPr/>
+          <p:nvPr/>
+        </p:nvGrpSpPr>
+        <p:grpSpPr>
+          <a:xfrm rot="5400000">
+            <a:off x="5312644" y="4419663"/>
+            <a:ext cx="412292" cy="206895"/>
+            <a:chOff x="4494990" y="1361228"/>
+            <a:chExt cx="412292" cy="206895"/>
+          </a:xfrm>
+        </p:grpSpPr>
+        <p:cxnSp>
+          <p:nvCxnSpPr>
+            <p:cNvPr id="26" name="直線矢印コネクタ 25">
+              <a:extLst>
+                <a:ext uri="{FF2B5EF4-FFF2-40B4-BE49-F238E27FC236}">
+                  <a16:creationId xmlns:a16="http://schemas.microsoft.com/office/drawing/2014/main" id="{2CCB82FF-E4F0-264E-82AB-649909FD6D5C}"/>
+                </a:ext>
+              </a:extLst>
+            </p:cNvPr>
+            <p:cNvCxnSpPr>
+              <a:cxnSpLocks/>
+            </p:cNvCxnSpPr>
+            <p:nvPr/>
+          </p:nvCxnSpPr>
+          <p:spPr>
+            <a:xfrm rot="16200000" flipV="1">
+              <a:off x="4692819" y="1451815"/>
+              <a:ext cx="0" cy="232616"/>
+            </a:xfrm>
+            <a:prstGeom prst="straightConnector1">
+              <a:avLst/>
+            </a:prstGeom>
+            <a:ln>
+              <a:solidFill>
+                <a:schemeClr val="tx1"/>
+              </a:solidFill>
+              <a:headEnd type="none" w="med" len="med"/>
+              <a:tailEnd type="triangle" w="med" len="med"/>
+            </a:ln>
+          </p:spPr>
+          <p:style>
+            <a:lnRef idx="1">
+              <a:schemeClr val="accent1"/>
+            </a:lnRef>
+            <a:fillRef idx="0">
+              <a:schemeClr val="accent1"/>
+            </a:fillRef>
+            <a:effectRef idx="0">
+              <a:schemeClr val="accent1"/>
+            </a:effectRef>
+            <a:fontRef idx="minor">
+              <a:schemeClr val="tx1"/>
+            </a:fontRef>
+          </p:style>
+        </p:cxnSp>
+        <p:sp>
+          <p:nvSpPr>
+            <p:cNvPr id="28" name="テキスト ボックス 27">
+              <a:extLst>
+                <a:ext uri="{FF2B5EF4-FFF2-40B4-BE49-F238E27FC236}">
+                  <a16:creationId xmlns:a16="http://schemas.microsoft.com/office/drawing/2014/main" id="{1D4D3052-31C5-3D4C-96AF-65989348D8FC}"/>
+                </a:ext>
+              </a:extLst>
+            </p:cNvPr>
+            <p:cNvSpPr txBox="1"/>
+            <p:nvPr/>
+          </p:nvSpPr>
+          <p:spPr>
+            <a:xfrm>
+              <a:off x="4494990" y="1361228"/>
+              <a:ext cx="412292" cy="200055"/>
+            </a:xfrm>
+            <a:prstGeom prst="rect">
+              <a:avLst/>
+            </a:prstGeom>
+            <a:noFill/>
+          </p:spPr>
+          <p:txBody>
+            <a:bodyPr wrap="none" rtlCol="0">
+              <a:spAutoFit/>
+            </a:bodyPr>
+            <a:lstStyle/>
+            <a:p>
+              <a:r>
+                <a:rPr kumimoji="1" lang="en-US" altLang="ja-JP" sz="700" dirty="0"/>
+                <a:t>START</a:t>
+              </a:r>
+            </a:p>
+          </p:txBody>
+        </p:sp>
+      </p:grpSp>
+      <p:grpSp>
+        <p:nvGrpSpPr>
+          <p:cNvPr id="51" name="グループ化 50">
+            <a:extLst>
+              <a:ext uri="{FF2B5EF4-FFF2-40B4-BE49-F238E27FC236}">
+                <a16:creationId xmlns:a16="http://schemas.microsoft.com/office/drawing/2014/main" id="{AF16ECC3-ACBA-1745-BCA3-076A00393B88}"/>
+              </a:ext>
+            </a:extLst>
+          </p:cNvPr>
+          <p:cNvGrpSpPr/>
+          <p:nvPr/>
+        </p:nvGrpSpPr>
+        <p:grpSpPr>
+          <a:xfrm rot="5400000">
+            <a:off x="5598080" y="4420598"/>
+            <a:ext cx="359394" cy="206895"/>
+            <a:chOff x="4521439" y="1361228"/>
+            <a:chExt cx="359394" cy="206895"/>
+          </a:xfrm>
+        </p:grpSpPr>
+        <p:cxnSp>
+          <p:nvCxnSpPr>
+            <p:cNvPr id="52" name="直線矢印コネクタ 51">
+              <a:extLst>
+                <a:ext uri="{FF2B5EF4-FFF2-40B4-BE49-F238E27FC236}">
+                  <a16:creationId xmlns:a16="http://schemas.microsoft.com/office/drawing/2014/main" id="{4DFEA886-5B0D-814D-8D06-5C29CEC6644E}"/>
+                </a:ext>
+              </a:extLst>
+            </p:cNvPr>
+            <p:cNvCxnSpPr>
+              <a:cxnSpLocks/>
+            </p:cNvCxnSpPr>
+            <p:nvPr/>
+          </p:nvCxnSpPr>
+          <p:spPr>
+            <a:xfrm rot="16200000" flipV="1">
+              <a:off x="4692819" y="1451815"/>
+              <a:ext cx="0" cy="232616"/>
+            </a:xfrm>
+            <a:prstGeom prst="straightConnector1">
+              <a:avLst/>
+            </a:prstGeom>
+            <a:ln>
+              <a:solidFill>
+                <a:schemeClr val="tx1"/>
+              </a:solidFill>
+              <a:headEnd type="none" w="med" len="med"/>
+              <a:tailEnd type="triangle" w="med" len="med"/>
+            </a:ln>
+          </p:spPr>
+          <p:style>
+            <a:lnRef idx="1">
+              <a:schemeClr val="accent1"/>
+            </a:lnRef>
+            <a:fillRef idx="0">
+              <a:schemeClr val="accent1"/>
+            </a:fillRef>
+            <a:effectRef idx="0">
+              <a:schemeClr val="accent1"/>
+            </a:effectRef>
+            <a:fontRef idx="minor">
+              <a:schemeClr val="tx1"/>
+            </a:fontRef>
+          </p:style>
+        </p:cxnSp>
+        <p:sp>
+          <p:nvSpPr>
+            <p:cNvPr id="53" name="テキスト ボックス 52">
+              <a:extLst>
+                <a:ext uri="{FF2B5EF4-FFF2-40B4-BE49-F238E27FC236}">
+                  <a16:creationId xmlns:a16="http://schemas.microsoft.com/office/drawing/2014/main" id="{486FB3B2-E1C0-E84A-A955-F99B73EEFB1A}"/>
+                </a:ext>
+              </a:extLst>
+            </p:cNvPr>
+            <p:cNvSpPr txBox="1"/>
+            <p:nvPr/>
+          </p:nvSpPr>
+          <p:spPr>
+            <a:xfrm>
+              <a:off x="4521439" y="1361228"/>
+              <a:ext cx="359394" cy="200055"/>
+            </a:xfrm>
+            <a:prstGeom prst="rect">
+              <a:avLst/>
+            </a:prstGeom>
+            <a:noFill/>
+          </p:spPr>
+          <p:txBody>
+            <a:bodyPr wrap="none" rtlCol="0">
+              <a:spAutoFit/>
+            </a:bodyPr>
+            <a:lstStyle/>
+            <a:p>
+              <a:r>
+                <a:rPr kumimoji="1" lang="en-US" altLang="ja-JP" sz="700" dirty="0" err="1"/>
+                <a:t>WRn</a:t>
+              </a:r>
+              <a:endParaRPr kumimoji="1" lang="en-US" altLang="ja-JP" sz="700" dirty="0"/>
+            </a:p>
+          </p:txBody>
+        </p:sp>
+      </p:grpSp>
+      <p:grpSp>
+        <p:nvGrpSpPr>
+          <p:cNvPr id="54" name="グループ化 53">
+            <a:extLst>
+              <a:ext uri="{FF2B5EF4-FFF2-40B4-BE49-F238E27FC236}">
+                <a16:creationId xmlns:a16="http://schemas.microsoft.com/office/drawing/2014/main" id="{76AE0C37-A767-8744-9CE9-DAA76CCCBE79}"/>
+              </a:ext>
+            </a:extLst>
+          </p:cNvPr>
+          <p:cNvGrpSpPr/>
+          <p:nvPr/>
+        </p:nvGrpSpPr>
+        <p:grpSpPr>
+          <a:xfrm rot="5400000">
+            <a:off x="5042704" y="4414992"/>
+            <a:ext cx="426720" cy="206895"/>
+            <a:chOff x="4487778" y="1361228"/>
+            <a:chExt cx="426720" cy="206895"/>
+          </a:xfrm>
+        </p:grpSpPr>
+        <p:cxnSp>
+          <p:nvCxnSpPr>
+            <p:cNvPr id="55" name="直線矢印コネクタ 54">
+              <a:extLst>
+                <a:ext uri="{FF2B5EF4-FFF2-40B4-BE49-F238E27FC236}">
+                  <a16:creationId xmlns:a16="http://schemas.microsoft.com/office/drawing/2014/main" id="{F882966B-42C4-8240-8100-3425568F58A3}"/>
+                </a:ext>
+              </a:extLst>
+            </p:cNvPr>
+            <p:cNvCxnSpPr>
+              <a:cxnSpLocks/>
+            </p:cNvCxnSpPr>
+            <p:nvPr/>
+          </p:nvCxnSpPr>
+          <p:spPr>
+            <a:xfrm rot="16200000" flipV="1">
+              <a:off x="4692819" y="1451815"/>
+              <a:ext cx="0" cy="232616"/>
+            </a:xfrm>
+            <a:prstGeom prst="straightConnector1">
+              <a:avLst/>
+            </a:prstGeom>
+            <a:ln>
+              <a:solidFill>
+                <a:schemeClr val="tx1"/>
+              </a:solidFill>
+              <a:headEnd type="none" w="med" len="med"/>
+              <a:tailEnd type="triangle" w="med" len="med"/>
+            </a:ln>
+          </p:spPr>
+          <p:style>
+            <a:lnRef idx="1">
+              <a:schemeClr val="accent1"/>
+            </a:lnRef>
+            <a:fillRef idx="0">
+              <a:schemeClr val="accent1"/>
+            </a:fillRef>
+            <a:effectRef idx="0">
+              <a:schemeClr val="accent1"/>
+            </a:effectRef>
+            <a:fontRef idx="minor">
+              <a:schemeClr val="tx1"/>
+            </a:fontRef>
+          </p:style>
+        </p:cxnSp>
+        <p:sp>
+          <p:nvSpPr>
+            <p:cNvPr id="56" name="テキスト ボックス 55">
+              <a:extLst>
+                <a:ext uri="{FF2B5EF4-FFF2-40B4-BE49-F238E27FC236}">
+                  <a16:creationId xmlns:a16="http://schemas.microsoft.com/office/drawing/2014/main" id="{18495864-E54D-1748-8879-86ED7B16F68F}"/>
+                </a:ext>
+              </a:extLst>
+            </p:cNvPr>
+            <p:cNvSpPr txBox="1"/>
+            <p:nvPr/>
+          </p:nvSpPr>
+          <p:spPr>
+            <a:xfrm>
+              <a:off x="4487778" y="1361228"/>
+              <a:ext cx="426720" cy="200055"/>
+            </a:xfrm>
+            <a:prstGeom prst="rect">
+              <a:avLst/>
+            </a:prstGeom>
+            <a:noFill/>
+          </p:spPr>
+          <p:txBody>
+            <a:bodyPr wrap="none" rtlCol="0">
+              <a:spAutoFit/>
+            </a:bodyPr>
+            <a:lstStyle/>
+            <a:p>
+              <a:r>
+                <a:rPr kumimoji="1" lang="en-US" altLang="ja-JP" sz="700" dirty="0"/>
+                <a:t>FINISH</a:t>
+              </a:r>
+            </a:p>
+          </p:txBody>
+        </p:sp>
+      </p:grpSp>
+      <p:sp>
+        <p:nvSpPr>
+          <p:cNvPr id="57" name="左矢印 56">
+            <a:extLst>
+              <a:ext uri="{FF2B5EF4-FFF2-40B4-BE49-F238E27FC236}">
+                <a16:creationId xmlns:a16="http://schemas.microsoft.com/office/drawing/2014/main" id="{A6D8ECEC-236F-FB4D-AA0F-3CBD32965576}"/>
+              </a:ext>
+            </a:extLst>
+          </p:cNvPr>
+          <p:cNvSpPr/>
+          <p:nvPr/>
+        </p:nvSpPr>
+        <p:spPr>
+          <a:xfrm>
+            <a:off x="1833278" y="5333261"/>
+            <a:ext cx="1300543" cy="240287"/>
+          </a:xfrm>
+          <a:prstGeom prst="leftArrow">
+            <a:avLst/>
+          </a:prstGeom>
+          <a:solidFill>
+            <a:schemeClr val="bg1"/>
+          </a:solidFill>
+          <a:ln>
+            <a:solidFill>
+              <a:schemeClr val="tx1"/>
+            </a:solidFill>
+            <a:headEnd type="none" w="med" len="med"/>
+            <a:tailEnd type="none" w="med" len="med"/>
+          </a:ln>
+        </p:spPr>
+        <p:style>
+          <a:lnRef idx="1">
+            <a:schemeClr val="accent1"/>
+          </a:lnRef>
+          <a:fillRef idx="0">
+            <a:schemeClr val="accent1"/>
+          </a:fillRef>
+          <a:effectRef idx="0">
+            <a:schemeClr val="accent1"/>
+          </a:effectRef>
+          <a:fontRef idx="minor">
+            <a:schemeClr val="tx1"/>
+          </a:fontRef>
+        </p:style>
+        <p:txBody>
+          <a:bodyPr rtlCol="0" anchor="ctr"/>
+          <a:lstStyle/>
+          <a:p>
+            <a:pPr algn="ctr"/>
+            <a:endParaRPr kumimoji="1" lang="ja-JP" altLang="en-US"/>
+          </a:p>
+        </p:txBody>
+      </p:sp>
+      <p:sp>
+        <p:nvSpPr>
+          <p:cNvPr id="58" name="右矢印 57">
+            <a:extLst>
+              <a:ext uri="{FF2B5EF4-FFF2-40B4-BE49-F238E27FC236}">
+                <a16:creationId xmlns:a16="http://schemas.microsoft.com/office/drawing/2014/main" id="{CC16C04C-96C1-5645-A749-1139F62020FD}"/>
+              </a:ext>
+            </a:extLst>
+          </p:cNvPr>
+          <p:cNvSpPr/>
+          <p:nvPr/>
+        </p:nvSpPr>
+        <p:spPr>
+          <a:xfrm>
+            <a:off x="1834213" y="5564198"/>
+            <a:ext cx="1300543" cy="240287"/>
+          </a:xfrm>
+          <a:prstGeom prst="rightArrow">
+            <a:avLst/>
+          </a:prstGeom>
+          <a:solidFill>
+            <a:schemeClr val="bg1"/>
+          </a:solidFill>
+          <a:ln>
+            <a:solidFill>
+              <a:schemeClr val="tx1"/>
+            </a:solidFill>
+            <a:headEnd type="none" w="med" len="med"/>
+            <a:tailEnd type="none" w="med" len="med"/>
+          </a:ln>
+        </p:spPr>
+        <p:style>
+          <a:lnRef idx="1">
+            <a:schemeClr val="accent1"/>
+          </a:lnRef>
+          <a:fillRef idx="0">
+            <a:schemeClr val="accent1"/>
+          </a:fillRef>
+          <a:effectRef idx="0">
+            <a:schemeClr val="accent1"/>
+          </a:effectRef>
+          <a:fontRef idx="minor">
+            <a:schemeClr val="tx1"/>
+          </a:fontRef>
+        </p:style>
+        <p:txBody>
+          <a:bodyPr rtlCol="0" anchor="ctr"/>
+          <a:lstStyle/>
+          <a:p>
+            <a:pPr algn="ctr"/>
+            <a:endParaRPr kumimoji="1" lang="ja-JP" altLang="en-US"/>
+          </a:p>
+        </p:txBody>
+      </p:sp>
+      <p:sp>
+        <p:nvSpPr>
+          <p:cNvPr id="59" name="正方形/長方形 58">
+            <a:extLst>
+              <a:ext uri="{FF2B5EF4-FFF2-40B4-BE49-F238E27FC236}">
+                <a16:creationId xmlns:a16="http://schemas.microsoft.com/office/drawing/2014/main" id="{0B2DB729-1B8C-F34F-8ED0-53396A0FFF4C}"/>
+              </a:ext>
+            </a:extLst>
+          </p:cNvPr>
+          <p:cNvSpPr/>
+          <p:nvPr/>
+        </p:nvSpPr>
+        <p:spPr>
+          <a:xfrm>
+            <a:off x="3372016" y="4636709"/>
+            <a:ext cx="544152" cy="1918557"/>
+          </a:xfrm>
+          <a:prstGeom prst="rect">
+            <a:avLst/>
+          </a:prstGeom>
+          <a:ln>
+            <a:solidFill>
+              <a:schemeClr val="tx1"/>
+            </a:solidFill>
+            <a:headEnd type="none" w="med" len="med"/>
+            <a:tailEnd type="none" w="med" len="med"/>
+          </a:ln>
+        </p:spPr>
+        <p:style>
+          <a:lnRef idx="1">
+            <a:schemeClr val="accent1"/>
+          </a:lnRef>
+          <a:fillRef idx="0">
+            <a:schemeClr val="accent1"/>
+          </a:fillRef>
+          <a:effectRef idx="0">
+            <a:schemeClr val="accent1"/>
+          </a:effectRef>
+          <a:fontRef idx="minor">
+            <a:schemeClr val="tx1"/>
+          </a:fontRef>
+        </p:style>
+        <p:txBody>
+          <a:bodyPr wrap="none" rtlCol="0" anchor="ctr"/>
+          <a:lstStyle/>
+          <a:p>
+            <a:pPr algn="ctr"/>
+            <a:r>
+              <a:rPr kumimoji="1" lang="en-US" altLang="ja-JP" sz="1000" dirty="0"/>
+              <a:t>selector</a:t>
+            </a:r>
+            <a:endParaRPr kumimoji="1" lang="ja-JP" altLang="en-US" sz="1000"/>
+          </a:p>
+        </p:txBody>
+      </p:sp>
+      <p:sp>
+        <p:nvSpPr>
+          <p:cNvPr id="60" name="正方形/長方形 59">
+            <a:extLst>
+              <a:ext uri="{FF2B5EF4-FFF2-40B4-BE49-F238E27FC236}">
+                <a16:creationId xmlns:a16="http://schemas.microsoft.com/office/drawing/2014/main" id="{34B57291-C640-D742-8A63-8DC83DD8F738}"/>
+              </a:ext>
+            </a:extLst>
+          </p:cNvPr>
+          <p:cNvSpPr/>
+          <p:nvPr/>
+        </p:nvSpPr>
+        <p:spPr>
+          <a:xfrm>
+            <a:off x="6594367" y="5344481"/>
+            <a:ext cx="1217953" cy="970498"/>
           </a:xfrm>
           <a:prstGeom prst="rect">
             <a:avLst/>
@@ -14438,10 +16399,273 @@
       </p:sp>
       <p:sp>
         <p:nvSpPr>
-          <p:cNvPr id="4" name="テキスト ボックス 3">
-            <a:extLst>
-              <a:ext uri="{FF2B5EF4-FFF2-40B4-BE49-F238E27FC236}">
-                <a16:creationId xmlns:a16="http://schemas.microsoft.com/office/drawing/2014/main" id="{FF67E3ED-A669-D046-AABA-0348F93D1514}"/>
+          <p:cNvPr id="69" name="左矢印 68">
+            <a:extLst>
+              <a:ext uri="{FF2B5EF4-FFF2-40B4-BE49-F238E27FC236}">
+                <a16:creationId xmlns:a16="http://schemas.microsoft.com/office/drawing/2014/main" id="{40C08B66-62BA-1A47-9290-944DB4ABF59D}"/>
+              </a:ext>
+            </a:extLst>
+          </p:cNvPr>
+          <p:cNvSpPr/>
+          <p:nvPr/>
+        </p:nvSpPr>
+        <p:spPr>
+          <a:xfrm>
+            <a:off x="3941635" y="5877413"/>
+            <a:ext cx="2620720" cy="240287"/>
+          </a:xfrm>
+          <a:prstGeom prst="leftArrow">
+            <a:avLst/>
+          </a:prstGeom>
+          <a:solidFill>
+            <a:schemeClr val="bg1"/>
+          </a:solidFill>
+          <a:ln>
+            <a:solidFill>
+              <a:schemeClr val="tx1"/>
+            </a:solidFill>
+            <a:headEnd type="none" w="med" len="med"/>
+            <a:tailEnd type="none" w="med" len="med"/>
+          </a:ln>
+        </p:spPr>
+        <p:style>
+          <a:lnRef idx="1">
+            <a:schemeClr val="accent1"/>
+          </a:lnRef>
+          <a:fillRef idx="0">
+            <a:schemeClr val="accent1"/>
+          </a:fillRef>
+          <a:effectRef idx="0">
+            <a:schemeClr val="accent1"/>
+          </a:effectRef>
+          <a:fontRef idx="minor">
+            <a:schemeClr val="tx1"/>
+          </a:fontRef>
+        </p:style>
+        <p:txBody>
+          <a:bodyPr rtlCol="0" anchor="ctr"/>
+          <a:lstStyle/>
+          <a:p>
+            <a:pPr algn="ctr"/>
+            <a:endParaRPr kumimoji="1" lang="ja-JP" altLang="en-US"/>
+          </a:p>
+        </p:txBody>
+      </p:sp>
+      <p:sp>
+        <p:nvSpPr>
+          <p:cNvPr id="70" name="右矢印 69">
+            <a:extLst>
+              <a:ext uri="{FF2B5EF4-FFF2-40B4-BE49-F238E27FC236}">
+                <a16:creationId xmlns:a16="http://schemas.microsoft.com/office/drawing/2014/main" id="{30592B4D-F0FD-B14A-9934-B8D405B480C3}"/>
+              </a:ext>
+            </a:extLst>
+          </p:cNvPr>
+          <p:cNvSpPr/>
+          <p:nvPr/>
+        </p:nvSpPr>
+        <p:spPr>
+          <a:xfrm>
+            <a:off x="3942570" y="6108350"/>
+            <a:ext cx="2620720" cy="240287"/>
+          </a:xfrm>
+          <a:prstGeom prst="rightArrow">
+            <a:avLst/>
+          </a:prstGeom>
+          <a:solidFill>
+            <a:schemeClr val="bg1"/>
+          </a:solidFill>
+          <a:ln>
+            <a:solidFill>
+              <a:schemeClr val="tx1"/>
+            </a:solidFill>
+            <a:headEnd type="none" w="med" len="med"/>
+            <a:tailEnd type="none" w="med" len="med"/>
+          </a:ln>
+        </p:spPr>
+        <p:style>
+          <a:lnRef idx="1">
+            <a:schemeClr val="accent1"/>
+          </a:lnRef>
+          <a:fillRef idx="0">
+            <a:schemeClr val="accent1"/>
+          </a:fillRef>
+          <a:effectRef idx="0">
+            <a:schemeClr val="accent1"/>
+          </a:effectRef>
+          <a:fontRef idx="minor">
+            <a:schemeClr val="tx1"/>
+          </a:fontRef>
+        </p:style>
+        <p:txBody>
+          <a:bodyPr rtlCol="0" anchor="ctr"/>
+          <a:lstStyle/>
+          <a:p>
+            <a:pPr algn="ctr"/>
+            <a:endParaRPr kumimoji="1" lang="ja-JP" altLang="en-US"/>
+          </a:p>
+        </p:txBody>
+      </p:sp>
+      <p:sp>
+        <p:nvSpPr>
+          <p:cNvPr id="71" name="正方形/長方形 70">
+            <a:extLst>
+              <a:ext uri="{FF2B5EF4-FFF2-40B4-BE49-F238E27FC236}">
+                <a16:creationId xmlns:a16="http://schemas.microsoft.com/office/drawing/2014/main" id="{C311AAF7-6494-024A-B6E4-5DBF4AA8D0B3}"/>
+              </a:ext>
+            </a:extLst>
+          </p:cNvPr>
+          <p:cNvSpPr/>
+          <p:nvPr/>
+        </p:nvSpPr>
+        <p:spPr>
+          <a:xfrm>
+            <a:off x="4771887" y="5354766"/>
+            <a:ext cx="1144403" cy="488989"/>
+          </a:xfrm>
+          <a:prstGeom prst="rect">
+            <a:avLst/>
+          </a:prstGeom>
+          <a:noFill/>
+          <a:ln>
+            <a:solidFill>
+              <a:schemeClr val="tx1"/>
+            </a:solidFill>
+          </a:ln>
+        </p:spPr>
+        <p:style>
+          <a:lnRef idx="2">
+            <a:schemeClr val="accent1">
+              <a:shade val="50000"/>
+            </a:schemeClr>
+          </a:lnRef>
+          <a:fillRef idx="1">
+            <a:schemeClr val="accent1"/>
+          </a:fillRef>
+          <a:effectRef idx="0">
+            <a:schemeClr val="accent1"/>
+          </a:effectRef>
+          <a:fontRef idx="minor">
+            <a:schemeClr val="lt1"/>
+          </a:fontRef>
+        </p:style>
+        <p:txBody>
+          <a:bodyPr rtlCol="0" anchor="t"/>
+          <a:lstStyle/>
+          <a:p>
+            <a:pPr algn="ctr"/>
+            <a:r>
+              <a:rPr kumimoji="1" lang="en-US" altLang="ja-JP" sz="700" dirty="0">
+                <a:solidFill>
+                  <a:schemeClr val="tx1"/>
+                </a:solidFill>
+              </a:rPr>
+              <a:t>I2C_MUX_PROXY</a:t>
+            </a:r>
+            <a:endParaRPr kumimoji="1" lang="ja-JP" altLang="en-US" sz="700">
+              <a:solidFill>
+                <a:schemeClr val="tx1"/>
+              </a:solidFill>
+            </a:endParaRPr>
+          </a:p>
+        </p:txBody>
+      </p:sp>
+      <p:cxnSp>
+        <p:nvCxnSpPr>
+          <p:cNvPr id="72" name="直線矢印コネクタ 71">
+            <a:extLst>
+              <a:ext uri="{FF2B5EF4-FFF2-40B4-BE49-F238E27FC236}">
+                <a16:creationId xmlns:a16="http://schemas.microsoft.com/office/drawing/2014/main" id="{DC6C78EB-1537-C94F-8451-376A7E279A39}"/>
+              </a:ext>
+            </a:extLst>
+          </p:cNvPr>
+          <p:cNvCxnSpPr>
+            <a:cxnSpLocks/>
+          </p:cNvCxnSpPr>
+          <p:nvPr/>
+        </p:nvCxnSpPr>
+        <p:spPr>
+          <a:xfrm>
+            <a:off x="5914560" y="5746844"/>
+            <a:ext cx="662047" cy="0"/>
+          </a:xfrm>
+          <a:prstGeom prst="straightConnector1">
+            <a:avLst/>
+          </a:prstGeom>
+          <a:ln>
+            <a:solidFill>
+              <a:schemeClr val="tx1"/>
+            </a:solidFill>
+            <a:headEnd type="none" w="med" len="med"/>
+            <a:tailEnd type="triangle" w="med" len="med"/>
+          </a:ln>
+        </p:spPr>
+        <p:style>
+          <a:lnRef idx="1">
+            <a:schemeClr val="accent1"/>
+          </a:lnRef>
+          <a:fillRef idx="0">
+            <a:schemeClr val="accent1"/>
+          </a:fillRef>
+          <a:effectRef idx="0">
+            <a:schemeClr val="accent1"/>
+          </a:effectRef>
+          <a:fontRef idx="minor">
+            <a:schemeClr val="tx1"/>
+          </a:fontRef>
+        </p:style>
+      </p:cxnSp>
+      <p:cxnSp>
+        <p:nvCxnSpPr>
+          <p:cNvPr id="73" name="直線矢印コネクタ 72">
+            <a:extLst>
+              <a:ext uri="{FF2B5EF4-FFF2-40B4-BE49-F238E27FC236}">
+                <a16:creationId xmlns:a16="http://schemas.microsoft.com/office/drawing/2014/main" id="{8AF8C61A-974E-C74B-A4A2-1033FDA50F2F}"/>
+              </a:ext>
+            </a:extLst>
+          </p:cNvPr>
+          <p:cNvCxnSpPr>
+            <a:cxnSpLocks/>
+            <a:endCxn id="71" idx="1"/>
+          </p:cNvCxnSpPr>
+          <p:nvPr/>
+        </p:nvCxnSpPr>
+        <p:spPr>
+          <a:xfrm rot="16200000" flipH="1">
+            <a:off x="3993291" y="4820665"/>
+            <a:ext cx="1248652" cy="308540"/>
+          </a:xfrm>
+          <a:prstGeom prst="bentConnector2">
+            <a:avLst/>
+          </a:prstGeom>
+          <a:ln>
+            <a:solidFill>
+              <a:schemeClr val="tx1"/>
+            </a:solidFill>
+            <a:headEnd type="none" w="med" len="med"/>
+            <a:tailEnd type="triangle" w="med" len="med"/>
+          </a:ln>
+        </p:spPr>
+        <p:style>
+          <a:lnRef idx="1">
+            <a:schemeClr val="accent1"/>
+          </a:lnRef>
+          <a:fillRef idx="0">
+            <a:schemeClr val="accent1"/>
+          </a:fillRef>
+          <a:effectRef idx="0">
+            <a:schemeClr val="accent1"/>
+          </a:effectRef>
+          <a:fontRef idx="minor">
+            <a:schemeClr val="tx1"/>
+          </a:fontRef>
+        </p:style>
+      </p:cxnSp>
+      <p:sp>
+        <p:nvSpPr>
+          <p:cNvPr id="78" name="テキスト ボックス 77">
+            <a:extLst>
+              <a:ext uri="{FF2B5EF4-FFF2-40B4-BE49-F238E27FC236}">
+                <a16:creationId xmlns:a16="http://schemas.microsoft.com/office/drawing/2014/main" id="{43C478D3-F10B-254E-A5D5-7954B6F5139F}"/>
               </a:ext>
             </a:extLst>
           </p:cNvPr>
@@ -14450,8 +16674,8 @@
         </p:nvSpPr>
         <p:spPr>
           <a:xfrm>
-            <a:off x="5258954" y="1024754"/>
-            <a:ext cx="441146" cy="200055"/>
+            <a:off x="5305759" y="5649733"/>
+            <a:ext cx="622286" cy="200055"/>
           </a:xfrm>
           <a:prstGeom prst="rect">
             <a:avLst/>
@@ -14466,6 +16690,41 @@
           <a:p>
             <a:r>
               <a:rPr kumimoji="1" lang="en-US" altLang="ja-JP" sz="700" dirty="0"/>
+              <a:t>TXEMP_PXY</a:t>
+            </a:r>
+          </a:p>
+        </p:txBody>
+      </p:sp>
+      <p:sp>
+        <p:nvSpPr>
+          <p:cNvPr id="79" name="テキスト ボックス 78">
+            <a:extLst>
+              <a:ext uri="{FF2B5EF4-FFF2-40B4-BE49-F238E27FC236}">
+                <a16:creationId xmlns:a16="http://schemas.microsoft.com/office/drawing/2014/main" id="{FC686388-1EB4-AD43-874D-41FF268837E4}"/>
+              </a:ext>
+            </a:extLst>
+          </p:cNvPr>
+          <p:cNvSpPr txBox="1"/>
+          <p:nvPr/>
+        </p:nvSpPr>
+        <p:spPr>
+          <a:xfrm>
+            <a:off x="6576129" y="5633335"/>
+            <a:ext cx="441146" cy="200055"/>
+          </a:xfrm>
+          <a:prstGeom prst="rect">
+            <a:avLst/>
+          </a:prstGeom>
+          <a:noFill/>
+        </p:spPr>
+        <p:txBody>
+          <a:bodyPr wrap="none" rtlCol="0">
+            <a:spAutoFit/>
+          </a:bodyPr>
+          <a:lstStyle/>
+          <a:p>
+            <a:r>
+              <a:rPr kumimoji="1" lang="en-US" altLang="ja-JP" sz="700" dirty="0"/>
               <a:t>TXEMP</a:t>
             </a:r>
           </a:p>
@@ -14473,10 +16732,91 @@
       </p:sp>
       <p:cxnSp>
         <p:nvCxnSpPr>
-          <p:cNvPr id="5" name="直線矢印コネクタ 4">
-            <a:extLst>
-              <a:ext uri="{FF2B5EF4-FFF2-40B4-BE49-F238E27FC236}">
-                <a16:creationId xmlns:a16="http://schemas.microsoft.com/office/drawing/2014/main" id="{068E6286-E542-6449-95F9-083ED417C259}"/>
+          <p:cNvPr id="81" name="直線矢印コネクタ 80">
+            <a:extLst>
+              <a:ext uri="{FF2B5EF4-FFF2-40B4-BE49-F238E27FC236}">
+                <a16:creationId xmlns:a16="http://schemas.microsoft.com/office/drawing/2014/main" id="{435127D2-A7A9-594D-A933-2B41157C1456}"/>
+              </a:ext>
+            </a:extLst>
+          </p:cNvPr>
+          <p:cNvCxnSpPr>
+            <a:cxnSpLocks/>
+            <a:stCxn id="7" idx="2"/>
+            <a:endCxn id="59" idx="0"/>
+          </p:cNvCxnSpPr>
+          <p:nvPr/>
+        </p:nvCxnSpPr>
+        <p:spPr>
+          <a:xfrm flipH="1">
+            <a:off x="3644092" y="4367438"/>
+            <a:ext cx="1" cy="269271"/>
+          </a:xfrm>
+          <a:prstGeom prst="straightConnector1">
+            <a:avLst/>
+          </a:prstGeom>
+          <a:ln>
+            <a:solidFill>
+              <a:schemeClr val="tx1"/>
+            </a:solidFill>
+            <a:tailEnd type="triangle"/>
+          </a:ln>
+        </p:spPr>
+        <p:style>
+          <a:lnRef idx="1">
+            <a:schemeClr val="accent1"/>
+          </a:lnRef>
+          <a:fillRef idx="0">
+            <a:schemeClr val="accent1"/>
+          </a:fillRef>
+          <a:effectRef idx="0">
+            <a:schemeClr val="accent1"/>
+          </a:effectRef>
+          <a:fontRef idx="minor">
+            <a:schemeClr val="tx1"/>
+          </a:fontRef>
+        </p:style>
+      </p:cxnSp>
+      <p:sp>
+        <p:nvSpPr>
+          <p:cNvPr id="84" name="テキスト ボックス 83">
+            <a:extLst>
+              <a:ext uri="{FF2B5EF4-FFF2-40B4-BE49-F238E27FC236}">
+                <a16:creationId xmlns:a16="http://schemas.microsoft.com/office/drawing/2014/main" id="{8195C950-3A91-694C-92D8-BE40886FD5AA}"/>
+              </a:ext>
+            </a:extLst>
+          </p:cNvPr>
+          <p:cNvSpPr txBox="1"/>
+          <p:nvPr/>
+        </p:nvSpPr>
+        <p:spPr>
+          <a:xfrm>
+            <a:off x="3358411" y="4396778"/>
+            <a:ext cx="308098" cy="200055"/>
+          </a:xfrm>
+          <a:prstGeom prst="rect">
+            <a:avLst/>
+          </a:prstGeom>
+          <a:noFill/>
+        </p:spPr>
+        <p:txBody>
+          <a:bodyPr wrap="none" rtlCol="0">
+            <a:spAutoFit/>
+          </a:bodyPr>
+          <a:lstStyle/>
+          <a:p>
+            <a:r>
+              <a:rPr kumimoji="1" lang="en-US" altLang="ja-JP" sz="700" dirty="0"/>
+              <a:t>SEL</a:t>
+            </a:r>
+          </a:p>
+        </p:txBody>
+      </p:sp>
+      <p:cxnSp>
+        <p:nvCxnSpPr>
+          <p:cNvPr id="85" name="直線矢印コネクタ 84">
+            <a:extLst>
+              <a:ext uri="{FF2B5EF4-FFF2-40B4-BE49-F238E27FC236}">
+                <a16:creationId xmlns:a16="http://schemas.microsoft.com/office/drawing/2014/main" id="{92DBFBDC-1C0D-7B4F-B9EB-0A399BA8A018}"/>
               </a:ext>
             </a:extLst>
           </p:cNvPr>
@@ -14486,9 +16826,9 @@
           <p:nvPr/>
         </p:nvCxnSpPr>
         <p:spPr>
-          <a:xfrm>
-            <a:off x="4602994" y="1121433"/>
-            <a:ext cx="662047" cy="0"/>
+          <a:xfrm flipH="1">
+            <a:off x="1816367" y="4711066"/>
+            <a:ext cx="1558676" cy="0"/>
           </a:xfrm>
           <a:prstGeom prst="straightConnector1">
             <a:avLst/>
@@ -14518,10 +16858,298 @@
       </p:cxnSp>
       <p:sp>
         <p:nvSpPr>
-          <p:cNvPr id="6" name="正方形/長方形 5">
-            <a:extLst>
-              <a:ext uri="{FF2B5EF4-FFF2-40B4-BE49-F238E27FC236}">
-                <a16:creationId xmlns:a16="http://schemas.microsoft.com/office/drawing/2014/main" id="{07E44EF8-12C3-8B4F-9295-8E5708D9CCF9}"/>
+          <p:cNvPr id="88" name="テキスト ボックス 87">
+            <a:extLst>
+              <a:ext uri="{FF2B5EF4-FFF2-40B4-BE49-F238E27FC236}">
+                <a16:creationId xmlns:a16="http://schemas.microsoft.com/office/drawing/2014/main" id="{F3877AB2-C80C-2E43-A0BF-284657F55EF5}"/>
+              </a:ext>
+            </a:extLst>
+          </p:cNvPr>
+          <p:cNvSpPr txBox="1"/>
+          <p:nvPr/>
+        </p:nvSpPr>
+        <p:spPr>
+          <a:xfrm>
+            <a:off x="1855078" y="4531539"/>
+            <a:ext cx="359394" cy="200055"/>
+          </a:xfrm>
+          <a:prstGeom prst="rect">
+            <a:avLst/>
+          </a:prstGeom>
+          <a:noFill/>
+        </p:spPr>
+        <p:txBody>
+          <a:bodyPr wrap="none" rtlCol="0">
+            <a:spAutoFit/>
+          </a:bodyPr>
+          <a:lstStyle/>
+          <a:p>
+            <a:r>
+              <a:rPr kumimoji="1" lang="en-US" altLang="ja-JP" sz="700" dirty="0" err="1"/>
+              <a:t>WRn</a:t>
+            </a:r>
+            <a:endParaRPr kumimoji="1" lang="en-US" altLang="ja-JP" sz="700" dirty="0"/>
+          </a:p>
+        </p:txBody>
+      </p:sp>
+      <p:cxnSp>
+        <p:nvCxnSpPr>
+          <p:cNvPr id="89" name="直線矢印コネクタ 88">
+            <a:extLst>
+              <a:ext uri="{FF2B5EF4-FFF2-40B4-BE49-F238E27FC236}">
+                <a16:creationId xmlns:a16="http://schemas.microsoft.com/office/drawing/2014/main" id="{8B053211-00AF-2448-B94D-B57E0280EA74}"/>
+              </a:ext>
+            </a:extLst>
+          </p:cNvPr>
+          <p:cNvCxnSpPr>
+            <a:cxnSpLocks/>
+            <a:stCxn id="7" idx="1"/>
+          </p:cNvCxnSpPr>
+          <p:nvPr/>
+        </p:nvCxnSpPr>
+        <p:spPr>
+          <a:xfrm rot="10800000" flipV="1">
+            <a:off x="2651377" y="3901824"/>
+            <a:ext cx="427282" cy="964888"/>
+          </a:xfrm>
+          <a:prstGeom prst="bentConnector2">
+            <a:avLst/>
+          </a:prstGeom>
+          <a:ln>
+            <a:solidFill>
+              <a:schemeClr val="tx1"/>
+            </a:solidFill>
+            <a:headEnd type="none" w="med" len="med"/>
+            <a:tailEnd type="triangle" w="med" len="med"/>
+          </a:ln>
+        </p:spPr>
+        <p:style>
+          <a:lnRef idx="1">
+            <a:schemeClr val="accent1"/>
+          </a:lnRef>
+          <a:fillRef idx="0">
+            <a:schemeClr val="accent1"/>
+          </a:fillRef>
+          <a:effectRef idx="0">
+            <a:schemeClr val="accent1"/>
+          </a:effectRef>
+          <a:fontRef idx="minor">
+            <a:schemeClr val="tx1"/>
+          </a:fontRef>
+        </p:style>
+      </p:cxnSp>
+      <p:sp>
+        <p:nvSpPr>
+          <p:cNvPr id="90" name="テキスト ボックス 89">
+            <a:extLst>
+              <a:ext uri="{FF2B5EF4-FFF2-40B4-BE49-F238E27FC236}">
+                <a16:creationId xmlns:a16="http://schemas.microsoft.com/office/drawing/2014/main" id="{0034AF8B-EC88-D446-82BB-49CB914ADC2F}"/>
+              </a:ext>
+            </a:extLst>
+          </p:cNvPr>
+          <p:cNvSpPr txBox="1"/>
+          <p:nvPr/>
+        </p:nvSpPr>
+        <p:spPr>
+          <a:xfrm>
+            <a:off x="1861622" y="4678330"/>
+            <a:ext cx="412292" cy="200055"/>
+          </a:xfrm>
+          <a:prstGeom prst="rect">
+            <a:avLst/>
+          </a:prstGeom>
+          <a:noFill/>
+        </p:spPr>
+        <p:txBody>
+          <a:bodyPr wrap="none" rtlCol="0">
+            <a:spAutoFit/>
+          </a:bodyPr>
+          <a:lstStyle/>
+          <a:p>
+            <a:r>
+              <a:rPr kumimoji="1" lang="en-US" altLang="ja-JP" sz="700" dirty="0"/>
+              <a:t>START</a:t>
+            </a:r>
+          </a:p>
+        </p:txBody>
+      </p:sp>
+      <p:cxnSp>
+        <p:nvCxnSpPr>
+          <p:cNvPr id="93" name="直線矢印コネクタ 92">
+            <a:extLst>
+              <a:ext uri="{FF2B5EF4-FFF2-40B4-BE49-F238E27FC236}">
+                <a16:creationId xmlns:a16="http://schemas.microsoft.com/office/drawing/2014/main" id="{F569FE49-2311-114A-A256-986CE0BDB685}"/>
+              </a:ext>
+            </a:extLst>
+          </p:cNvPr>
+          <p:cNvCxnSpPr>
+            <a:cxnSpLocks/>
+          </p:cNvCxnSpPr>
+          <p:nvPr/>
+        </p:nvCxnSpPr>
+        <p:spPr>
+          <a:xfrm flipH="1">
+            <a:off x="1817302" y="5031760"/>
+            <a:ext cx="1558676" cy="0"/>
+          </a:xfrm>
+          <a:prstGeom prst="straightConnector1">
+            <a:avLst/>
+          </a:prstGeom>
+          <a:ln>
+            <a:solidFill>
+              <a:schemeClr val="tx1"/>
+            </a:solidFill>
+            <a:headEnd type="none" w="med" len="med"/>
+            <a:tailEnd type="triangle" w="med" len="med"/>
+          </a:ln>
+        </p:spPr>
+        <p:style>
+          <a:lnRef idx="1">
+            <a:schemeClr val="accent1"/>
+          </a:lnRef>
+          <a:fillRef idx="0">
+            <a:schemeClr val="accent1"/>
+          </a:fillRef>
+          <a:effectRef idx="0">
+            <a:schemeClr val="accent1"/>
+          </a:effectRef>
+          <a:fontRef idx="minor">
+            <a:schemeClr val="tx1"/>
+          </a:fontRef>
+        </p:style>
+      </p:cxnSp>
+      <p:sp>
+        <p:nvSpPr>
+          <p:cNvPr id="94" name="テキスト ボックス 93">
+            <a:extLst>
+              <a:ext uri="{FF2B5EF4-FFF2-40B4-BE49-F238E27FC236}">
+                <a16:creationId xmlns:a16="http://schemas.microsoft.com/office/drawing/2014/main" id="{54872C76-BFC5-7C4C-942C-2FFD7CCEDCEC}"/>
+              </a:ext>
+            </a:extLst>
+          </p:cNvPr>
+          <p:cNvSpPr txBox="1"/>
+          <p:nvPr/>
+        </p:nvSpPr>
+        <p:spPr>
+          <a:xfrm>
+            <a:off x="1856013" y="4852233"/>
+            <a:ext cx="426720" cy="200055"/>
+          </a:xfrm>
+          <a:prstGeom prst="rect">
+            <a:avLst/>
+          </a:prstGeom>
+          <a:noFill/>
+        </p:spPr>
+        <p:txBody>
+          <a:bodyPr wrap="none" rtlCol="0">
+            <a:spAutoFit/>
+          </a:bodyPr>
+          <a:lstStyle/>
+          <a:p>
+            <a:r>
+              <a:rPr kumimoji="1" lang="en-US" altLang="ja-JP" sz="700" dirty="0"/>
+              <a:t>FINISH</a:t>
+            </a:r>
+          </a:p>
+        </p:txBody>
+      </p:sp>
+      <p:cxnSp>
+        <p:nvCxnSpPr>
+          <p:cNvPr id="95" name="直線矢印コネクタ 94">
+            <a:extLst>
+              <a:ext uri="{FF2B5EF4-FFF2-40B4-BE49-F238E27FC236}">
+                <a16:creationId xmlns:a16="http://schemas.microsoft.com/office/drawing/2014/main" id="{D99C8066-B54F-8248-97F8-8A135D2DE77C}"/>
+              </a:ext>
+            </a:extLst>
+          </p:cNvPr>
+          <p:cNvCxnSpPr>
+            <a:cxnSpLocks/>
+          </p:cNvCxnSpPr>
+          <p:nvPr/>
+        </p:nvCxnSpPr>
+        <p:spPr>
+          <a:xfrm flipH="1">
+            <a:off x="1822911" y="4863466"/>
+            <a:ext cx="1558676" cy="0"/>
+          </a:xfrm>
+          <a:prstGeom prst="straightConnector1">
+            <a:avLst/>
+          </a:prstGeom>
+          <a:ln>
+            <a:solidFill>
+              <a:schemeClr val="tx1"/>
+            </a:solidFill>
+            <a:headEnd type="none" w="med" len="med"/>
+            <a:tailEnd type="triangle" w="med" len="med"/>
+          </a:ln>
+        </p:spPr>
+        <p:style>
+          <a:lnRef idx="1">
+            <a:schemeClr val="accent1"/>
+          </a:lnRef>
+          <a:fillRef idx="0">
+            <a:schemeClr val="accent1"/>
+          </a:fillRef>
+          <a:effectRef idx="0">
+            <a:schemeClr val="accent1"/>
+          </a:effectRef>
+          <a:fontRef idx="minor">
+            <a:schemeClr val="tx1"/>
+          </a:fontRef>
+        </p:style>
+      </p:cxnSp>
+      <p:cxnSp>
+        <p:nvCxnSpPr>
+          <p:cNvPr id="97" name="直線矢印コネクタ 88">
+            <a:extLst>
+              <a:ext uri="{FF2B5EF4-FFF2-40B4-BE49-F238E27FC236}">
+                <a16:creationId xmlns:a16="http://schemas.microsoft.com/office/drawing/2014/main" id="{3469E083-227D-B942-A538-1E25CA5D93CA}"/>
+              </a:ext>
+            </a:extLst>
+          </p:cNvPr>
+          <p:cNvCxnSpPr>
+            <a:cxnSpLocks/>
+            <a:stCxn id="7" idx="1"/>
+          </p:cNvCxnSpPr>
+          <p:nvPr/>
+        </p:nvCxnSpPr>
+        <p:spPr>
+          <a:xfrm rot="10800000" flipV="1">
+            <a:off x="2735529" y="3901824"/>
+            <a:ext cx="343131" cy="802202"/>
+          </a:xfrm>
+          <a:prstGeom prst="bentConnector2">
+            <a:avLst/>
+          </a:prstGeom>
+          <a:ln>
+            <a:solidFill>
+              <a:schemeClr val="tx1"/>
+            </a:solidFill>
+            <a:headEnd type="none" w="med" len="med"/>
+            <a:tailEnd type="triangle" w="med" len="med"/>
+          </a:ln>
+        </p:spPr>
+        <p:style>
+          <a:lnRef idx="1">
+            <a:schemeClr val="accent1"/>
+          </a:lnRef>
+          <a:fillRef idx="0">
+            <a:schemeClr val="accent1"/>
+          </a:fillRef>
+          <a:effectRef idx="0">
+            <a:schemeClr val="accent1"/>
+          </a:effectRef>
+          <a:fontRef idx="minor">
+            <a:schemeClr val="tx1"/>
+          </a:fontRef>
+        </p:style>
+      </p:cxnSp>
+      <p:sp>
+        <p:nvSpPr>
+          <p:cNvPr id="110" name="円/楕円 109">
+            <a:extLst>
+              <a:ext uri="{FF2B5EF4-FFF2-40B4-BE49-F238E27FC236}">
+                <a16:creationId xmlns:a16="http://schemas.microsoft.com/office/drawing/2014/main" id="{365D0E40-F0D5-AB41-AA13-008F643944F0}"/>
               </a:ext>
             </a:extLst>
           </p:cNvPr>
@@ -14530,8 +17158,813 @@
         </p:nvSpPr>
         <p:spPr>
           <a:xfrm>
-            <a:off x="1103087" y="754743"/>
-            <a:ext cx="3635830" cy="4463143"/>
+            <a:off x="4913069" y="3672951"/>
+            <a:ext cx="251963" cy="241465"/>
+          </a:xfrm>
+          <a:prstGeom prst="ellipse">
+            <a:avLst/>
+          </a:prstGeom>
+          <a:ln>
+            <a:solidFill>
+              <a:schemeClr val="tx1"/>
+            </a:solidFill>
+            <a:headEnd type="none" w="med" len="med"/>
+            <a:tailEnd type="none" w="med" len="med"/>
+          </a:ln>
+        </p:spPr>
+        <p:style>
+          <a:lnRef idx="1">
+            <a:schemeClr val="accent1"/>
+          </a:lnRef>
+          <a:fillRef idx="0">
+            <a:schemeClr val="accent1"/>
+          </a:fillRef>
+          <a:effectRef idx="0">
+            <a:schemeClr val="accent1"/>
+          </a:effectRef>
+          <a:fontRef idx="minor">
+            <a:schemeClr val="tx1"/>
+          </a:fontRef>
+        </p:style>
+        <p:txBody>
+          <a:bodyPr wrap="none" rtlCol="0" anchor="ctr"/>
+          <a:lstStyle/>
+          <a:p>
+            <a:pPr algn="ctr"/>
+            <a:r>
+              <a:rPr kumimoji="1" lang="en-US" altLang="ja-JP" sz="700" dirty="0"/>
+              <a:t>FIN</a:t>
+            </a:r>
+            <a:endParaRPr kumimoji="1" lang="ja-JP" altLang="en-US" sz="700"/>
+          </a:p>
+        </p:txBody>
+      </p:sp>
+      <p:cxnSp>
+        <p:nvCxnSpPr>
+          <p:cNvPr id="117" name="カギ線コネクタ 32">
+            <a:extLst>
+              <a:ext uri="{FF2B5EF4-FFF2-40B4-BE49-F238E27FC236}">
+                <a16:creationId xmlns:a16="http://schemas.microsoft.com/office/drawing/2014/main" id="{F9333311-A274-B541-81C9-A2B48FF9E089}"/>
+              </a:ext>
+            </a:extLst>
+          </p:cNvPr>
+          <p:cNvCxnSpPr>
+            <a:cxnSpLocks/>
+            <a:stCxn id="110" idx="0"/>
+            <a:endCxn id="19" idx="2"/>
+          </p:cNvCxnSpPr>
+          <p:nvPr/>
+        </p:nvCxnSpPr>
+        <p:spPr>
+          <a:xfrm rot="5400000" flipH="1" flipV="1">
+            <a:off x="5087809" y="3528869"/>
+            <a:ext cx="95325" cy="192841"/>
+          </a:xfrm>
+          <a:prstGeom prst="curvedConnector2">
+            <a:avLst/>
+          </a:prstGeom>
+          <a:ln>
+            <a:solidFill>
+              <a:schemeClr val="tx1"/>
+            </a:solidFill>
+            <a:tailEnd type="triangle"/>
+          </a:ln>
+        </p:spPr>
+        <p:style>
+          <a:lnRef idx="1">
+            <a:schemeClr val="accent1"/>
+          </a:lnRef>
+          <a:fillRef idx="0">
+            <a:schemeClr val="accent1"/>
+          </a:fillRef>
+          <a:effectRef idx="0">
+            <a:schemeClr val="accent1"/>
+          </a:effectRef>
+          <a:fontRef idx="minor">
+            <a:schemeClr val="tx1"/>
+          </a:fontRef>
+        </p:style>
+      </p:cxnSp>
+      <p:sp>
+        <p:nvSpPr>
+          <p:cNvPr id="122" name="テキスト ボックス 121">
+            <a:extLst>
+              <a:ext uri="{FF2B5EF4-FFF2-40B4-BE49-F238E27FC236}">
+                <a16:creationId xmlns:a16="http://schemas.microsoft.com/office/drawing/2014/main" id="{98C88E56-A51C-604B-9D10-713B7BD58507}"/>
+              </a:ext>
+            </a:extLst>
+          </p:cNvPr>
+          <p:cNvSpPr txBox="1"/>
+          <p:nvPr/>
+        </p:nvSpPr>
+        <p:spPr>
+          <a:xfrm>
+            <a:off x="5134505" y="93362"/>
+            <a:ext cx="2643288" cy="338554"/>
+          </a:xfrm>
+          <a:prstGeom prst="rect">
+            <a:avLst/>
+          </a:prstGeom>
+          <a:noFill/>
+        </p:spPr>
+        <p:txBody>
+          <a:bodyPr wrap="none" rtlCol="0">
+            <a:spAutoFit/>
+          </a:bodyPr>
+          <a:lstStyle/>
+          <a:p>
+            <a:r>
+              <a:rPr kumimoji="1" lang="en-US" altLang="ja-JP" sz="1600" dirty="0"/>
+              <a:t>I2C_MUX_PROXY</a:t>
+            </a:r>
+            <a:r>
+              <a:rPr kumimoji="1" lang="ja-JP" altLang="en-US" sz="1600"/>
+              <a:t>の状態遷移</a:t>
+            </a:r>
+            <a:endParaRPr kumimoji="1" lang="en-US" altLang="ja-JP" sz="1600" dirty="0"/>
+          </a:p>
+        </p:txBody>
+      </p:sp>
+      <p:sp>
+        <p:nvSpPr>
+          <p:cNvPr id="123" name="円/楕円 122">
+            <a:extLst>
+              <a:ext uri="{FF2B5EF4-FFF2-40B4-BE49-F238E27FC236}">
+                <a16:creationId xmlns:a16="http://schemas.microsoft.com/office/drawing/2014/main" id="{A67F7786-E77D-CB43-A292-477354A98635}"/>
+              </a:ext>
+            </a:extLst>
+          </p:cNvPr>
+          <p:cNvSpPr/>
+          <p:nvPr/>
+        </p:nvSpPr>
+        <p:spPr>
+          <a:xfrm>
+            <a:off x="3549882" y="3626123"/>
+            <a:ext cx="251963" cy="241465"/>
+          </a:xfrm>
+          <a:prstGeom prst="ellipse">
+            <a:avLst/>
+          </a:prstGeom>
+          <a:ln>
+            <a:solidFill>
+              <a:schemeClr val="tx1"/>
+            </a:solidFill>
+            <a:headEnd type="none" w="med" len="med"/>
+            <a:tailEnd type="none" w="med" len="med"/>
+          </a:ln>
+        </p:spPr>
+        <p:style>
+          <a:lnRef idx="1">
+            <a:schemeClr val="accent1"/>
+          </a:lnRef>
+          <a:fillRef idx="0">
+            <a:schemeClr val="accent1"/>
+          </a:fillRef>
+          <a:effectRef idx="0">
+            <a:schemeClr val="accent1"/>
+          </a:effectRef>
+          <a:fontRef idx="minor">
+            <a:schemeClr val="tx1"/>
+          </a:fontRef>
+        </p:style>
+        <p:txBody>
+          <a:bodyPr wrap="none" rtlCol="0" anchor="ctr"/>
+          <a:lstStyle/>
+          <a:p>
+            <a:pPr algn="ctr"/>
+            <a:r>
+              <a:rPr kumimoji="1" lang="en-US" altLang="ja-JP" sz="700" dirty="0"/>
+              <a:t>IDLE</a:t>
+            </a:r>
+            <a:endParaRPr kumimoji="1" lang="ja-JP" altLang="en-US" sz="700"/>
+          </a:p>
+        </p:txBody>
+      </p:sp>
+      <p:sp>
+        <p:nvSpPr>
+          <p:cNvPr id="124" name="円/楕円 123">
+            <a:extLst>
+              <a:ext uri="{FF2B5EF4-FFF2-40B4-BE49-F238E27FC236}">
+                <a16:creationId xmlns:a16="http://schemas.microsoft.com/office/drawing/2014/main" id="{F37160D1-EE50-BB47-86D7-63B2E00D86BE}"/>
+              </a:ext>
+            </a:extLst>
+          </p:cNvPr>
+          <p:cNvSpPr/>
+          <p:nvPr/>
+        </p:nvSpPr>
+        <p:spPr>
+          <a:xfrm>
+            <a:off x="3876383" y="3833318"/>
+            <a:ext cx="251963" cy="241465"/>
+          </a:xfrm>
+          <a:prstGeom prst="ellipse">
+            <a:avLst/>
+          </a:prstGeom>
+          <a:ln>
+            <a:solidFill>
+              <a:schemeClr val="tx1"/>
+            </a:solidFill>
+            <a:headEnd type="none" w="med" len="med"/>
+            <a:tailEnd type="none" w="med" len="med"/>
+          </a:ln>
+        </p:spPr>
+        <p:style>
+          <a:lnRef idx="1">
+            <a:schemeClr val="accent1"/>
+          </a:lnRef>
+          <a:fillRef idx="0">
+            <a:schemeClr val="accent1"/>
+          </a:fillRef>
+          <a:effectRef idx="0">
+            <a:schemeClr val="accent1"/>
+          </a:effectRef>
+          <a:fontRef idx="minor">
+            <a:schemeClr val="tx1"/>
+          </a:fontRef>
+        </p:style>
+        <p:txBody>
+          <a:bodyPr wrap="none" rtlCol="0" anchor="ctr"/>
+          <a:lstStyle/>
+          <a:p>
+            <a:pPr algn="ctr"/>
+            <a:r>
+              <a:rPr kumimoji="1" lang="en-US" altLang="ja-JP" sz="700" dirty="0"/>
+              <a:t>START</a:t>
+            </a:r>
+            <a:endParaRPr kumimoji="1" lang="ja-JP" altLang="en-US" sz="700"/>
+          </a:p>
+        </p:txBody>
+      </p:sp>
+      <p:sp>
+        <p:nvSpPr>
+          <p:cNvPr id="125" name="円/楕円 124">
+            <a:extLst>
+              <a:ext uri="{FF2B5EF4-FFF2-40B4-BE49-F238E27FC236}">
+                <a16:creationId xmlns:a16="http://schemas.microsoft.com/office/drawing/2014/main" id="{895C2202-0680-B046-A229-66C00C6694C0}"/>
+              </a:ext>
+            </a:extLst>
+          </p:cNvPr>
+          <p:cNvSpPr/>
+          <p:nvPr/>
+        </p:nvSpPr>
+        <p:spPr>
+          <a:xfrm>
+            <a:off x="3549882" y="4060027"/>
+            <a:ext cx="251963" cy="241465"/>
+          </a:xfrm>
+          <a:prstGeom prst="ellipse">
+            <a:avLst/>
+          </a:prstGeom>
+          <a:ln>
+            <a:solidFill>
+              <a:schemeClr val="tx1"/>
+            </a:solidFill>
+            <a:headEnd type="none" w="med" len="med"/>
+            <a:tailEnd type="none" w="med" len="med"/>
+          </a:ln>
+        </p:spPr>
+        <p:style>
+          <a:lnRef idx="1">
+            <a:schemeClr val="accent1"/>
+          </a:lnRef>
+          <a:fillRef idx="0">
+            <a:schemeClr val="accent1"/>
+          </a:fillRef>
+          <a:effectRef idx="0">
+            <a:schemeClr val="accent1"/>
+          </a:effectRef>
+          <a:fontRef idx="minor">
+            <a:schemeClr val="tx1"/>
+          </a:fontRef>
+        </p:style>
+        <p:txBody>
+          <a:bodyPr wrap="none" rtlCol="0" anchor="ctr"/>
+          <a:lstStyle/>
+          <a:p>
+            <a:pPr algn="ctr"/>
+            <a:r>
+              <a:rPr kumimoji="1" lang="en-US" altLang="ja-JP" sz="700" dirty="0"/>
+              <a:t>GRANT</a:t>
+            </a:r>
+            <a:endParaRPr kumimoji="1" lang="ja-JP" altLang="en-US" sz="700"/>
+          </a:p>
+        </p:txBody>
+      </p:sp>
+      <p:cxnSp>
+        <p:nvCxnSpPr>
+          <p:cNvPr id="126" name="カギ線コネクタ 32">
+            <a:extLst>
+              <a:ext uri="{FF2B5EF4-FFF2-40B4-BE49-F238E27FC236}">
+                <a16:creationId xmlns:a16="http://schemas.microsoft.com/office/drawing/2014/main" id="{4B634F22-C0AA-B545-93D5-209FCB657877}"/>
+              </a:ext>
+            </a:extLst>
+          </p:cNvPr>
+          <p:cNvCxnSpPr>
+            <a:cxnSpLocks/>
+            <a:stCxn id="123" idx="6"/>
+            <a:endCxn id="124" idx="0"/>
+          </p:cNvCxnSpPr>
+          <p:nvPr/>
+        </p:nvCxnSpPr>
+        <p:spPr>
+          <a:xfrm>
+            <a:off x="3801845" y="3746856"/>
+            <a:ext cx="200520" cy="86462"/>
+          </a:xfrm>
+          <a:prstGeom prst="curvedConnector2">
+            <a:avLst/>
+          </a:prstGeom>
+          <a:ln>
+            <a:solidFill>
+              <a:schemeClr val="tx1"/>
+            </a:solidFill>
+            <a:tailEnd type="triangle"/>
+          </a:ln>
+        </p:spPr>
+        <p:style>
+          <a:lnRef idx="1">
+            <a:schemeClr val="accent1"/>
+          </a:lnRef>
+          <a:fillRef idx="0">
+            <a:schemeClr val="accent1"/>
+          </a:fillRef>
+          <a:effectRef idx="0">
+            <a:schemeClr val="accent1"/>
+          </a:effectRef>
+          <a:fontRef idx="minor">
+            <a:schemeClr val="tx1"/>
+          </a:fontRef>
+        </p:style>
+      </p:cxnSp>
+      <p:cxnSp>
+        <p:nvCxnSpPr>
+          <p:cNvPr id="127" name="カギ線コネクタ 32">
+            <a:extLst>
+              <a:ext uri="{FF2B5EF4-FFF2-40B4-BE49-F238E27FC236}">
+                <a16:creationId xmlns:a16="http://schemas.microsoft.com/office/drawing/2014/main" id="{ADCE03BC-6408-9A49-A394-BD7D2C70A1C6}"/>
+              </a:ext>
+            </a:extLst>
+          </p:cNvPr>
+          <p:cNvCxnSpPr>
+            <a:cxnSpLocks/>
+            <a:stCxn id="124" idx="4"/>
+            <a:endCxn id="125" idx="6"/>
+          </p:cNvCxnSpPr>
+          <p:nvPr/>
+        </p:nvCxnSpPr>
+        <p:spPr>
+          <a:xfrm rot="5400000">
+            <a:off x="3849117" y="4027511"/>
+            <a:ext cx="105977" cy="200520"/>
+          </a:xfrm>
+          <a:prstGeom prst="curvedConnector2">
+            <a:avLst/>
+          </a:prstGeom>
+          <a:ln>
+            <a:solidFill>
+              <a:schemeClr val="tx1"/>
+            </a:solidFill>
+            <a:tailEnd type="triangle"/>
+          </a:ln>
+        </p:spPr>
+        <p:style>
+          <a:lnRef idx="1">
+            <a:schemeClr val="accent1"/>
+          </a:lnRef>
+          <a:fillRef idx="0">
+            <a:schemeClr val="accent1"/>
+          </a:fillRef>
+          <a:effectRef idx="0">
+            <a:schemeClr val="accent1"/>
+          </a:effectRef>
+          <a:fontRef idx="minor">
+            <a:schemeClr val="tx1"/>
+          </a:fontRef>
+        </p:style>
+      </p:cxnSp>
+      <p:cxnSp>
+        <p:nvCxnSpPr>
+          <p:cNvPr id="128" name="カギ線コネクタ 32">
+            <a:extLst>
+              <a:ext uri="{FF2B5EF4-FFF2-40B4-BE49-F238E27FC236}">
+                <a16:creationId xmlns:a16="http://schemas.microsoft.com/office/drawing/2014/main" id="{611E70D7-8E93-F243-B373-1ECA3ADD111E}"/>
+              </a:ext>
+            </a:extLst>
+          </p:cNvPr>
+          <p:cNvCxnSpPr>
+            <a:cxnSpLocks/>
+            <a:stCxn id="125" idx="2"/>
+            <a:endCxn id="129" idx="4"/>
+          </p:cNvCxnSpPr>
+          <p:nvPr/>
+        </p:nvCxnSpPr>
+        <p:spPr>
+          <a:xfrm rot="10800000">
+            <a:off x="3357042" y="4083646"/>
+            <a:ext cx="192841" cy="97114"/>
+          </a:xfrm>
+          <a:prstGeom prst="curvedConnector2">
+            <a:avLst/>
+          </a:prstGeom>
+          <a:ln>
+            <a:solidFill>
+              <a:schemeClr val="tx1"/>
+            </a:solidFill>
+            <a:tailEnd type="triangle"/>
+          </a:ln>
+        </p:spPr>
+        <p:style>
+          <a:lnRef idx="1">
+            <a:schemeClr val="accent1"/>
+          </a:lnRef>
+          <a:fillRef idx="0">
+            <a:schemeClr val="accent1"/>
+          </a:fillRef>
+          <a:effectRef idx="0">
+            <a:schemeClr val="accent1"/>
+          </a:effectRef>
+          <a:fontRef idx="minor">
+            <a:schemeClr val="tx1"/>
+          </a:fontRef>
+        </p:style>
+      </p:cxnSp>
+      <p:sp>
+        <p:nvSpPr>
+          <p:cNvPr id="129" name="円/楕円 128">
+            <a:extLst>
+              <a:ext uri="{FF2B5EF4-FFF2-40B4-BE49-F238E27FC236}">
+                <a16:creationId xmlns:a16="http://schemas.microsoft.com/office/drawing/2014/main" id="{9B8EAD23-71E9-5743-ACDB-CF3F1D9180A7}"/>
+              </a:ext>
+            </a:extLst>
+          </p:cNvPr>
+          <p:cNvSpPr/>
+          <p:nvPr/>
+        </p:nvSpPr>
+        <p:spPr>
+          <a:xfrm>
+            <a:off x="3231059" y="3842181"/>
+            <a:ext cx="251963" cy="241465"/>
+          </a:xfrm>
+          <a:prstGeom prst="ellipse">
+            <a:avLst/>
+          </a:prstGeom>
+          <a:ln>
+            <a:solidFill>
+              <a:schemeClr val="tx1"/>
+            </a:solidFill>
+            <a:headEnd type="none" w="med" len="med"/>
+            <a:tailEnd type="none" w="med" len="med"/>
+          </a:ln>
+        </p:spPr>
+        <p:style>
+          <a:lnRef idx="1">
+            <a:schemeClr val="accent1"/>
+          </a:lnRef>
+          <a:fillRef idx="0">
+            <a:schemeClr val="accent1"/>
+          </a:fillRef>
+          <a:effectRef idx="0">
+            <a:schemeClr val="accent1"/>
+          </a:effectRef>
+          <a:fontRef idx="minor">
+            <a:schemeClr val="tx1"/>
+          </a:fontRef>
+        </p:style>
+        <p:txBody>
+          <a:bodyPr wrap="none" rtlCol="0" anchor="ctr"/>
+          <a:lstStyle/>
+          <a:p>
+            <a:pPr algn="ctr"/>
+            <a:r>
+              <a:rPr kumimoji="1" lang="en-US" altLang="ja-JP" sz="700" dirty="0"/>
+              <a:t>BUSY</a:t>
+            </a:r>
+            <a:endParaRPr kumimoji="1" lang="ja-JP" altLang="en-US" sz="700"/>
+          </a:p>
+        </p:txBody>
+      </p:sp>
+      <p:cxnSp>
+        <p:nvCxnSpPr>
+          <p:cNvPr id="130" name="カギ線コネクタ 32">
+            <a:extLst>
+              <a:ext uri="{FF2B5EF4-FFF2-40B4-BE49-F238E27FC236}">
+                <a16:creationId xmlns:a16="http://schemas.microsoft.com/office/drawing/2014/main" id="{18F67FC6-788F-0A46-AEBA-EB484552DF58}"/>
+              </a:ext>
+            </a:extLst>
+          </p:cNvPr>
+          <p:cNvCxnSpPr>
+            <a:cxnSpLocks/>
+            <a:stCxn id="129" idx="0"/>
+            <a:endCxn id="123" idx="2"/>
+          </p:cNvCxnSpPr>
+          <p:nvPr/>
+        </p:nvCxnSpPr>
+        <p:spPr>
+          <a:xfrm rot="5400000" flipH="1" flipV="1">
+            <a:off x="3405799" y="3698099"/>
+            <a:ext cx="95325" cy="192841"/>
+          </a:xfrm>
+          <a:prstGeom prst="curvedConnector2">
+            <a:avLst/>
+          </a:prstGeom>
+          <a:ln>
+            <a:solidFill>
+              <a:schemeClr val="tx1"/>
+            </a:solidFill>
+            <a:tailEnd type="triangle"/>
+          </a:ln>
+        </p:spPr>
+        <p:style>
+          <a:lnRef idx="1">
+            <a:schemeClr val="accent1"/>
+          </a:lnRef>
+          <a:fillRef idx="0">
+            <a:schemeClr val="accent1"/>
+          </a:fillRef>
+          <a:effectRef idx="0">
+            <a:schemeClr val="accent1"/>
+          </a:effectRef>
+          <a:fontRef idx="minor">
+            <a:schemeClr val="tx1"/>
+          </a:fontRef>
+        </p:style>
+      </p:cxnSp>
+      <p:sp>
+        <p:nvSpPr>
+          <p:cNvPr id="131" name="テキスト ボックス 130">
+            <a:extLst>
+              <a:ext uri="{FF2B5EF4-FFF2-40B4-BE49-F238E27FC236}">
+                <a16:creationId xmlns:a16="http://schemas.microsoft.com/office/drawing/2014/main" id="{CD3BB4FF-8E55-494B-91A3-3F95A3AC89FD}"/>
+              </a:ext>
+            </a:extLst>
+          </p:cNvPr>
+          <p:cNvSpPr txBox="1"/>
+          <p:nvPr/>
+        </p:nvSpPr>
+        <p:spPr>
+          <a:xfrm>
+            <a:off x="854340" y="455054"/>
+            <a:ext cx="3934230" cy="1615827"/>
+          </a:xfrm>
+          <a:prstGeom prst="rect">
+            <a:avLst/>
+          </a:prstGeom>
+          <a:noFill/>
+        </p:spPr>
+        <p:txBody>
+          <a:bodyPr wrap="square" rtlCol="0">
+            <a:spAutoFit/>
+          </a:bodyPr>
+          <a:lstStyle/>
+          <a:p>
+            <a:pPr marL="285750" indent="-285750">
+              <a:buFont typeface="Arial" panose="020B0604020202020204" pitchFamily="34" charset="0"/>
+              <a:buChar char="•"/>
+            </a:pPr>
+            <a:r>
+              <a:rPr kumimoji="1" lang="en-US" altLang="ja-JP" sz="1100" dirty="0"/>
+              <a:t>IDLE</a:t>
+            </a:r>
+          </a:p>
+          <a:p>
+            <a:pPr marL="742950" lvl="1" indent="-285750">
+              <a:buFont typeface="Arial" panose="020B0604020202020204" pitchFamily="34" charset="0"/>
+              <a:buChar char="•"/>
+            </a:pPr>
+            <a:r>
+              <a:rPr kumimoji="1" lang="ja-JP" altLang="en-US" sz="1100"/>
+              <a:t>いずれかの</a:t>
+            </a:r>
+            <a:r>
+              <a:rPr kumimoji="1" lang="en-US" altLang="ja-JP" sz="1100" dirty="0"/>
+              <a:t>PROXY</a:t>
+            </a:r>
+            <a:r>
+              <a:rPr kumimoji="1" lang="ja-JP" altLang="en-US" sz="1100"/>
+              <a:t>からの</a:t>
+            </a:r>
+            <a:r>
+              <a:rPr kumimoji="1" lang="en-US" altLang="ja-JP" sz="1100" dirty="0"/>
+              <a:t>BUSREQ</a:t>
+            </a:r>
+            <a:r>
+              <a:rPr kumimoji="1" lang="ja-JP" altLang="en-US" sz="1100"/>
+              <a:t>待ち</a:t>
+            </a:r>
+            <a:endParaRPr kumimoji="1" lang="en-US" altLang="ja-JP" sz="1100" dirty="0"/>
+          </a:p>
+          <a:p>
+            <a:pPr marL="285750" indent="-285750">
+              <a:buFont typeface="Arial" panose="020B0604020202020204" pitchFamily="34" charset="0"/>
+              <a:buChar char="•"/>
+            </a:pPr>
+            <a:r>
+              <a:rPr kumimoji="1" lang="en-US" altLang="ja-JP" sz="1100" dirty="0"/>
+              <a:t>START</a:t>
+            </a:r>
+          </a:p>
+          <a:p>
+            <a:pPr marL="742950" lvl="1" indent="-285750">
+              <a:buFont typeface="Arial" panose="020B0604020202020204" pitchFamily="34" charset="0"/>
+              <a:buChar char="•"/>
+            </a:pPr>
+            <a:r>
+              <a:rPr kumimoji="1" lang="en-US" altLang="ja-JP" sz="1100" dirty="0"/>
+              <a:t>I2CIF</a:t>
+            </a:r>
+            <a:r>
+              <a:rPr kumimoji="1" lang="ja-JP" altLang="en-US" sz="1100"/>
+              <a:t>に対して</a:t>
+            </a:r>
+            <a:r>
+              <a:rPr kumimoji="1" lang="en-US" altLang="ja-JP" sz="1100" dirty="0"/>
+              <a:t>START</a:t>
+            </a:r>
+            <a:r>
+              <a:rPr kumimoji="1" lang="ja-JP" altLang="en-US" sz="1100"/>
+              <a:t>を代理発行して通信開始</a:t>
+            </a:r>
+            <a:endParaRPr kumimoji="1" lang="en-US" altLang="ja-JP" sz="1100" dirty="0"/>
+          </a:p>
+          <a:p>
+            <a:pPr marL="285750" indent="-285750">
+              <a:buFont typeface="Arial" panose="020B0604020202020204" pitchFamily="34" charset="0"/>
+              <a:buChar char="•"/>
+            </a:pPr>
+            <a:r>
+              <a:rPr kumimoji="1" lang="en-US" altLang="ja-JP" sz="1100" dirty="0"/>
+              <a:t>GRANT</a:t>
+            </a:r>
+          </a:p>
+          <a:p>
+            <a:pPr marL="742950" lvl="1" indent="-285750">
+              <a:buFont typeface="Arial" panose="020B0604020202020204" pitchFamily="34" charset="0"/>
+              <a:buChar char="•"/>
+            </a:pPr>
+            <a:r>
+              <a:rPr kumimoji="1" lang="ja-JP" altLang="en-US" sz="1100"/>
+              <a:t>選ばれた</a:t>
+            </a:r>
+            <a:r>
+              <a:rPr kumimoji="1" lang="en-US" altLang="ja-JP" sz="1100" dirty="0"/>
+              <a:t>PROXY</a:t>
+            </a:r>
+            <a:r>
+              <a:rPr kumimoji="1" lang="ja-JP" altLang="en-US" sz="1100"/>
+              <a:t>に対してバスの操作権限を譲</a:t>
+            </a:r>
+            <a:endParaRPr kumimoji="1" lang="en-US" altLang="ja-JP" sz="1100" dirty="0"/>
+          </a:p>
+          <a:p>
+            <a:pPr marL="285750" indent="-285750">
+              <a:buFont typeface="Arial" panose="020B0604020202020204" pitchFamily="34" charset="0"/>
+              <a:buChar char="•"/>
+            </a:pPr>
+            <a:r>
+              <a:rPr kumimoji="1" lang="en-US" altLang="ja-JP" sz="1100" dirty="0"/>
+              <a:t>BUSY</a:t>
+            </a:r>
+          </a:p>
+          <a:p>
+            <a:pPr marL="742950" lvl="1" indent="-285750">
+              <a:buFont typeface="Arial" panose="020B0604020202020204" pitchFamily="34" charset="0"/>
+              <a:buChar char="•"/>
+            </a:pPr>
+            <a:r>
+              <a:rPr kumimoji="1" lang="ja-JP" altLang="en-US" sz="1100"/>
+              <a:t>選ばれた</a:t>
+            </a:r>
+            <a:r>
+              <a:rPr kumimoji="1" lang="en-US" altLang="ja-JP" sz="1100" dirty="0"/>
+              <a:t>PROXY</a:t>
+            </a:r>
+            <a:r>
+              <a:rPr kumimoji="1" lang="ja-JP" altLang="en-US" sz="1100"/>
+              <a:t>がバスを解放するのを待つ</a:t>
+            </a:r>
+            <a:endParaRPr kumimoji="1" lang="en-US" altLang="ja-JP" sz="1100" dirty="0"/>
+          </a:p>
+          <a:p>
+            <a:pPr marL="285750" indent="-285750">
+              <a:buFont typeface="Arial" panose="020B0604020202020204" pitchFamily="34" charset="0"/>
+              <a:buChar char="•"/>
+            </a:pPr>
+            <a:endParaRPr kumimoji="1" lang="en-US" altLang="ja-JP" sz="1100" dirty="0"/>
+          </a:p>
+        </p:txBody>
+      </p:sp>
+      <p:sp>
+        <p:nvSpPr>
+          <p:cNvPr id="132" name="テキスト ボックス 131">
+            <a:extLst>
+              <a:ext uri="{FF2B5EF4-FFF2-40B4-BE49-F238E27FC236}">
+                <a16:creationId xmlns:a16="http://schemas.microsoft.com/office/drawing/2014/main" id="{3BA98EC7-5C9A-7047-A53A-4BFDC0B0CE31}"/>
+              </a:ext>
+            </a:extLst>
+          </p:cNvPr>
+          <p:cNvSpPr txBox="1"/>
+          <p:nvPr/>
+        </p:nvSpPr>
+        <p:spPr>
+          <a:xfrm>
+            <a:off x="923452" y="133467"/>
+            <a:ext cx="2686569" cy="338554"/>
+          </a:xfrm>
+          <a:prstGeom prst="rect">
+            <a:avLst/>
+          </a:prstGeom>
+          <a:noFill/>
+        </p:spPr>
+        <p:txBody>
+          <a:bodyPr wrap="none" rtlCol="0">
+            <a:spAutoFit/>
+          </a:bodyPr>
+          <a:lstStyle/>
+          <a:p>
+            <a:r>
+              <a:rPr kumimoji="1" lang="en-US" altLang="ja-JP" sz="1600" dirty="0"/>
+              <a:t>I2C_MUX</a:t>
+            </a:r>
+            <a:r>
+              <a:rPr kumimoji="1" lang="ja-JP" altLang="en-US" sz="1600"/>
+              <a:t>の状態遷移</a:t>
+            </a:r>
+            <a:r>
+              <a:rPr kumimoji="1" lang="en-US" altLang="ja-JP" sz="1600" dirty="0"/>
+              <a:t>(</a:t>
+            </a:r>
+            <a:r>
+              <a:rPr kumimoji="1" lang="en-US" altLang="ja-JP" sz="1600" dirty="0" err="1"/>
+              <a:t>arbitor</a:t>
+            </a:r>
+            <a:r>
+              <a:rPr kumimoji="1" lang="en-US" altLang="ja-JP" sz="1600" dirty="0"/>
+              <a:t>)</a:t>
+            </a:r>
+          </a:p>
+        </p:txBody>
+      </p:sp>
+      <p:cxnSp>
+        <p:nvCxnSpPr>
+          <p:cNvPr id="133" name="直線矢印コネクタ 72">
+            <a:extLst>
+              <a:ext uri="{FF2B5EF4-FFF2-40B4-BE49-F238E27FC236}">
+                <a16:creationId xmlns:a16="http://schemas.microsoft.com/office/drawing/2014/main" id="{2E01E128-D579-F443-9FAC-ABC7022664F3}"/>
+              </a:ext>
+            </a:extLst>
+          </p:cNvPr>
+          <p:cNvCxnSpPr>
+            <a:cxnSpLocks/>
+          </p:cNvCxnSpPr>
+          <p:nvPr/>
+        </p:nvCxnSpPr>
+        <p:spPr>
+          <a:xfrm rot="16200000" flipH="1">
+            <a:off x="4074092" y="4789171"/>
+            <a:ext cx="1147577" cy="248013"/>
+          </a:xfrm>
+          <a:prstGeom prst="bentConnector2">
+            <a:avLst/>
+          </a:prstGeom>
+          <a:ln>
+            <a:solidFill>
+              <a:schemeClr val="tx1"/>
+            </a:solidFill>
+            <a:headEnd type="triangle" w="med" len="med"/>
+            <a:tailEnd type="none" w="med" len="med"/>
+          </a:ln>
+        </p:spPr>
+        <p:style>
+          <a:lnRef idx="1">
+            <a:schemeClr val="accent1"/>
+          </a:lnRef>
+          <a:fillRef idx="0">
+            <a:schemeClr val="accent1"/>
+          </a:fillRef>
+          <a:effectRef idx="0">
+            <a:schemeClr val="accent1"/>
+          </a:effectRef>
+          <a:fontRef idx="minor">
+            <a:schemeClr val="tx1"/>
+          </a:fontRef>
+        </p:style>
+      </p:cxnSp>
+      <p:sp>
+        <p:nvSpPr>
+          <p:cNvPr id="136" name="正方形/長方形 135">
+            <a:extLst>
+              <a:ext uri="{FF2B5EF4-FFF2-40B4-BE49-F238E27FC236}">
+                <a16:creationId xmlns:a16="http://schemas.microsoft.com/office/drawing/2014/main" id="{2FA6CDE7-5A50-C742-AA8A-FBF41A3EBF5D}"/>
+              </a:ext>
+            </a:extLst>
+          </p:cNvPr>
+          <p:cNvSpPr/>
+          <p:nvPr/>
+        </p:nvSpPr>
+        <p:spPr>
+          <a:xfrm>
+            <a:off x="962526" y="2791697"/>
+            <a:ext cx="778042" cy="3962030"/>
           </a:xfrm>
           <a:prstGeom prst="rect">
             <a:avLst/>
@@ -14564,7 +17997,15 @@
           <a:lstStyle/>
           <a:p>
             <a:pPr algn="ctr"/>
-            <a:endParaRPr kumimoji="1" lang="ja-JP" altLang="en-US" sz="300">
+            <a:r>
+              <a:rPr kumimoji="1" lang="en-US" altLang="ja-JP" sz="1050" dirty="0">
+                <a:solidFill>
+                  <a:schemeClr val="tx1"/>
+                </a:solidFill>
+              </a:rPr>
+              <a:t>I2CIF</a:t>
+            </a:r>
+            <a:endParaRPr kumimoji="1" lang="ja-JP" altLang="en-US" sz="1050">
               <a:solidFill>
                 <a:schemeClr val="tx1"/>
               </a:solidFill>
@@ -14572,726 +18013,6 @@
           </a:p>
         </p:txBody>
       </p:sp>
-      <p:sp>
-        <p:nvSpPr>
-          <p:cNvPr id="7" name="正方形/長方形 6">
-            <a:extLst>
-              <a:ext uri="{FF2B5EF4-FFF2-40B4-BE49-F238E27FC236}">
-                <a16:creationId xmlns:a16="http://schemas.microsoft.com/office/drawing/2014/main" id="{7DD5E61F-723E-424D-AABC-D50ED9D1FD26}"/>
-              </a:ext>
-            </a:extLst>
-          </p:cNvPr>
-          <p:cNvSpPr/>
-          <p:nvPr/>
-        </p:nvSpPr>
-        <p:spPr>
-          <a:xfrm>
-            <a:off x="1779248" y="1204785"/>
-            <a:ext cx="1130867" cy="3701043"/>
-          </a:xfrm>
-          <a:prstGeom prst="rect">
-            <a:avLst/>
-          </a:prstGeom>
-          <a:noFill/>
-          <a:ln>
-            <a:solidFill>
-              <a:schemeClr val="tx1"/>
-            </a:solidFill>
-          </a:ln>
-        </p:spPr>
-        <p:style>
-          <a:lnRef idx="2">
-            <a:schemeClr val="accent1">
-              <a:shade val="50000"/>
-            </a:schemeClr>
-          </a:lnRef>
-          <a:fillRef idx="1">
-            <a:schemeClr val="accent1"/>
-          </a:fillRef>
-          <a:effectRef idx="0">
-            <a:schemeClr val="accent1"/>
-          </a:effectRef>
-          <a:fontRef idx="minor">
-            <a:schemeClr val="lt1"/>
-          </a:fontRef>
-        </p:style>
-        <p:txBody>
-          <a:bodyPr rtlCol="0" anchor="t"/>
-          <a:lstStyle/>
-          <a:p>
-            <a:pPr algn="ctr"/>
-            <a:r>
-              <a:rPr kumimoji="1" lang="en-US" altLang="ja-JP" sz="900" dirty="0">
-                <a:solidFill>
-                  <a:schemeClr val="tx1"/>
-                </a:solidFill>
-              </a:rPr>
-              <a:t>arbiter</a:t>
-            </a:r>
-            <a:endParaRPr kumimoji="1" lang="ja-JP" altLang="en-US" sz="900">
-              <a:solidFill>
-                <a:schemeClr val="tx1"/>
-              </a:solidFill>
-            </a:endParaRPr>
-          </a:p>
-        </p:txBody>
-      </p:sp>
-      <p:cxnSp>
-        <p:nvCxnSpPr>
-          <p:cNvPr id="8" name="直線矢印コネクタ 7">
-            <a:extLst>
-              <a:ext uri="{FF2B5EF4-FFF2-40B4-BE49-F238E27FC236}">
-                <a16:creationId xmlns:a16="http://schemas.microsoft.com/office/drawing/2014/main" id="{E922A9DB-318A-5047-AF7E-7EFC5B283F21}"/>
-              </a:ext>
-            </a:extLst>
-          </p:cNvPr>
-          <p:cNvCxnSpPr>
-            <a:cxnSpLocks/>
-          </p:cNvCxnSpPr>
-          <p:nvPr/>
-        </p:nvCxnSpPr>
-        <p:spPr>
-          <a:xfrm>
-            <a:off x="2931886" y="1752805"/>
-            <a:ext cx="515257" cy="0"/>
-          </a:xfrm>
-          <a:prstGeom prst="straightConnector1">
-            <a:avLst/>
-          </a:prstGeom>
-          <a:ln>
-            <a:solidFill>
-              <a:schemeClr val="tx1"/>
-            </a:solidFill>
-            <a:headEnd type="none" w="med" len="med"/>
-            <a:tailEnd type="triangle" w="med" len="med"/>
-          </a:ln>
-        </p:spPr>
-        <p:style>
-          <a:lnRef idx="1">
-            <a:schemeClr val="accent1"/>
-          </a:lnRef>
-          <a:fillRef idx="0">
-            <a:schemeClr val="accent1"/>
-          </a:fillRef>
-          <a:effectRef idx="0">
-            <a:schemeClr val="accent1"/>
-          </a:effectRef>
-          <a:fontRef idx="minor">
-            <a:schemeClr val="tx1"/>
-          </a:fontRef>
-        </p:style>
-      </p:cxnSp>
-      <p:cxnSp>
-        <p:nvCxnSpPr>
-          <p:cNvPr id="10" name="直線矢印コネクタ 9">
-            <a:extLst>
-              <a:ext uri="{FF2B5EF4-FFF2-40B4-BE49-F238E27FC236}">
-                <a16:creationId xmlns:a16="http://schemas.microsoft.com/office/drawing/2014/main" id="{5D5E283C-330A-0948-86C4-91B5F19D75CC}"/>
-              </a:ext>
-            </a:extLst>
-          </p:cNvPr>
-          <p:cNvCxnSpPr>
-            <a:cxnSpLocks/>
-          </p:cNvCxnSpPr>
-          <p:nvPr/>
-        </p:nvCxnSpPr>
-        <p:spPr>
-          <a:xfrm flipH="1">
-            <a:off x="2902858" y="1607663"/>
-            <a:ext cx="551542" cy="0"/>
-          </a:xfrm>
-          <a:prstGeom prst="straightConnector1">
-            <a:avLst/>
-          </a:prstGeom>
-          <a:ln>
-            <a:solidFill>
-              <a:schemeClr val="tx1"/>
-            </a:solidFill>
-            <a:headEnd type="none" w="med" len="med"/>
-            <a:tailEnd type="triangle" w="med" len="med"/>
-          </a:ln>
-        </p:spPr>
-        <p:style>
-          <a:lnRef idx="1">
-            <a:schemeClr val="accent1"/>
-          </a:lnRef>
-          <a:fillRef idx="0">
-            <a:schemeClr val="accent1"/>
-          </a:fillRef>
-          <a:effectRef idx="0">
-            <a:schemeClr val="accent1"/>
-          </a:effectRef>
-          <a:fontRef idx="minor">
-            <a:schemeClr val="tx1"/>
-          </a:fontRef>
-        </p:style>
-      </p:cxnSp>
-      <p:sp>
-        <p:nvSpPr>
-          <p:cNvPr id="15" name="テキスト ボックス 14">
-            <a:extLst>
-              <a:ext uri="{FF2B5EF4-FFF2-40B4-BE49-F238E27FC236}">
-                <a16:creationId xmlns:a16="http://schemas.microsoft.com/office/drawing/2014/main" id="{00307D3D-7302-094B-BBA3-E096BD9D965A}"/>
-              </a:ext>
-            </a:extLst>
-          </p:cNvPr>
-          <p:cNvSpPr txBox="1"/>
-          <p:nvPr/>
-        </p:nvSpPr>
-        <p:spPr>
-          <a:xfrm>
-            <a:off x="2972954" y="1416640"/>
-            <a:ext cx="484428" cy="200055"/>
-          </a:xfrm>
-          <a:prstGeom prst="rect">
-            <a:avLst/>
-          </a:prstGeom>
-          <a:noFill/>
-        </p:spPr>
-        <p:txBody>
-          <a:bodyPr wrap="none" rtlCol="0">
-            <a:spAutoFit/>
-          </a:bodyPr>
-          <a:lstStyle/>
-          <a:p>
-            <a:r>
-              <a:rPr kumimoji="1" lang="en-US" altLang="ja-JP" sz="700" dirty="0"/>
-              <a:t>BUSREQ</a:t>
-            </a:r>
-          </a:p>
-        </p:txBody>
-      </p:sp>
-      <p:sp>
-        <p:nvSpPr>
-          <p:cNvPr id="16" name="テキスト ボックス 15">
-            <a:extLst>
-              <a:ext uri="{FF2B5EF4-FFF2-40B4-BE49-F238E27FC236}">
-                <a16:creationId xmlns:a16="http://schemas.microsoft.com/office/drawing/2014/main" id="{E7FE1D41-4711-F24B-A164-7200A0BE791F}"/>
-              </a:ext>
-            </a:extLst>
-          </p:cNvPr>
-          <p:cNvSpPr txBox="1"/>
-          <p:nvPr/>
-        </p:nvSpPr>
-        <p:spPr>
-          <a:xfrm>
-            <a:off x="2972954" y="1598069"/>
-            <a:ext cx="489236" cy="200055"/>
-          </a:xfrm>
-          <a:prstGeom prst="rect">
-            <a:avLst/>
-          </a:prstGeom>
-          <a:noFill/>
-        </p:spPr>
-        <p:txBody>
-          <a:bodyPr wrap="none" rtlCol="0">
-            <a:spAutoFit/>
-          </a:bodyPr>
-          <a:lstStyle/>
-          <a:p>
-            <a:r>
-              <a:rPr kumimoji="1" lang="en-US" altLang="ja-JP" sz="700" dirty="0"/>
-              <a:t>BUSGNT</a:t>
-            </a:r>
-          </a:p>
-        </p:txBody>
-      </p:sp>
-      <p:cxnSp>
-        <p:nvCxnSpPr>
-          <p:cNvPr id="17" name="直線矢印コネクタ 16">
-            <a:extLst>
-              <a:ext uri="{FF2B5EF4-FFF2-40B4-BE49-F238E27FC236}">
-                <a16:creationId xmlns:a16="http://schemas.microsoft.com/office/drawing/2014/main" id="{FB73EA04-CDB0-394A-A47B-DE3DA66B1DEB}"/>
-              </a:ext>
-            </a:extLst>
-          </p:cNvPr>
-          <p:cNvCxnSpPr>
-            <a:cxnSpLocks/>
-          </p:cNvCxnSpPr>
-          <p:nvPr/>
-        </p:nvCxnSpPr>
-        <p:spPr>
-          <a:xfrm flipH="1">
-            <a:off x="2902858" y="1934235"/>
-            <a:ext cx="551542" cy="0"/>
-          </a:xfrm>
-          <a:prstGeom prst="straightConnector1">
-            <a:avLst/>
-          </a:prstGeom>
-          <a:ln>
-            <a:solidFill>
-              <a:schemeClr val="tx1"/>
-            </a:solidFill>
-            <a:headEnd type="none" w="med" len="med"/>
-            <a:tailEnd type="triangle" w="med" len="med"/>
-          </a:ln>
-        </p:spPr>
-        <p:style>
-          <a:lnRef idx="1">
-            <a:schemeClr val="accent1"/>
-          </a:lnRef>
-          <a:fillRef idx="0">
-            <a:schemeClr val="accent1"/>
-          </a:fillRef>
-          <a:effectRef idx="0">
-            <a:schemeClr val="accent1"/>
-          </a:effectRef>
-          <a:fontRef idx="minor">
-            <a:schemeClr val="tx1"/>
-          </a:fontRef>
-        </p:style>
-      </p:cxnSp>
-      <p:sp>
-        <p:nvSpPr>
-          <p:cNvPr id="18" name="テキスト ボックス 17">
-            <a:extLst>
-              <a:ext uri="{FF2B5EF4-FFF2-40B4-BE49-F238E27FC236}">
-                <a16:creationId xmlns:a16="http://schemas.microsoft.com/office/drawing/2014/main" id="{D16376C0-2767-7940-8FDB-9F4684C4FF84}"/>
-              </a:ext>
-            </a:extLst>
-          </p:cNvPr>
-          <p:cNvSpPr txBox="1"/>
-          <p:nvPr/>
-        </p:nvSpPr>
-        <p:spPr>
-          <a:xfrm>
-            <a:off x="2980211" y="1764984"/>
-            <a:ext cx="478016" cy="200055"/>
-          </a:xfrm>
-          <a:prstGeom prst="rect">
-            <a:avLst/>
-          </a:prstGeom>
-          <a:noFill/>
-        </p:spPr>
-        <p:txBody>
-          <a:bodyPr wrap="none" rtlCol="0">
-            <a:spAutoFit/>
-          </a:bodyPr>
-          <a:lstStyle/>
-          <a:p>
-            <a:r>
-              <a:rPr kumimoji="1" lang="en-US" altLang="ja-JP" sz="700" dirty="0"/>
-              <a:t>BUSACK</a:t>
-            </a:r>
-          </a:p>
-        </p:txBody>
-      </p:sp>
-      <p:sp>
-        <p:nvSpPr>
-          <p:cNvPr id="19" name="円/楕円 18">
-            <a:extLst>
-              <a:ext uri="{FF2B5EF4-FFF2-40B4-BE49-F238E27FC236}">
-                <a16:creationId xmlns:a16="http://schemas.microsoft.com/office/drawing/2014/main" id="{A919DBC7-CE18-6E49-963B-E56C419C0696}"/>
-              </a:ext>
-            </a:extLst>
-          </p:cNvPr>
-          <p:cNvSpPr/>
-          <p:nvPr/>
-        </p:nvSpPr>
-        <p:spPr>
-          <a:xfrm>
-            <a:off x="3788229" y="1117600"/>
-            <a:ext cx="348343" cy="333829"/>
-          </a:xfrm>
-          <a:prstGeom prst="ellipse">
-            <a:avLst/>
-          </a:prstGeom>
-          <a:ln>
-            <a:solidFill>
-              <a:schemeClr val="tx1"/>
-            </a:solidFill>
-            <a:headEnd type="none" w="med" len="med"/>
-            <a:tailEnd type="none" w="med" len="med"/>
-          </a:ln>
-        </p:spPr>
-        <p:style>
-          <a:lnRef idx="1">
-            <a:schemeClr val="accent1"/>
-          </a:lnRef>
-          <a:fillRef idx="0">
-            <a:schemeClr val="accent1"/>
-          </a:fillRef>
-          <a:effectRef idx="0">
-            <a:schemeClr val="accent1"/>
-          </a:effectRef>
-          <a:fontRef idx="minor">
-            <a:schemeClr val="tx1"/>
-          </a:fontRef>
-        </p:style>
-        <p:txBody>
-          <a:bodyPr wrap="none" rtlCol="0" anchor="ctr"/>
-          <a:lstStyle/>
-          <a:p>
-            <a:pPr algn="ctr"/>
-            <a:r>
-              <a:rPr kumimoji="1" lang="en-US" altLang="ja-JP" sz="1100" dirty="0"/>
-              <a:t>IDLE</a:t>
-            </a:r>
-            <a:endParaRPr kumimoji="1" lang="ja-JP" altLang="en-US" sz="1100"/>
-          </a:p>
-        </p:txBody>
-      </p:sp>
-      <p:sp>
-        <p:nvSpPr>
-          <p:cNvPr id="20" name="円/楕円 19">
-            <a:extLst>
-              <a:ext uri="{FF2B5EF4-FFF2-40B4-BE49-F238E27FC236}">
-                <a16:creationId xmlns:a16="http://schemas.microsoft.com/office/drawing/2014/main" id="{F9493EE6-F0F4-0746-8FF6-CA091D3B3849}"/>
-              </a:ext>
-            </a:extLst>
-          </p:cNvPr>
-          <p:cNvSpPr/>
-          <p:nvPr/>
-        </p:nvSpPr>
-        <p:spPr>
-          <a:xfrm>
-            <a:off x="3788229" y="1524000"/>
-            <a:ext cx="348343" cy="333829"/>
-          </a:xfrm>
-          <a:prstGeom prst="ellipse">
-            <a:avLst/>
-          </a:prstGeom>
-          <a:ln>
-            <a:solidFill>
-              <a:schemeClr val="tx1"/>
-            </a:solidFill>
-            <a:headEnd type="none" w="med" len="med"/>
-            <a:tailEnd type="none" w="med" len="med"/>
-          </a:ln>
-        </p:spPr>
-        <p:style>
-          <a:lnRef idx="1">
-            <a:schemeClr val="accent1"/>
-          </a:lnRef>
-          <a:fillRef idx="0">
-            <a:schemeClr val="accent1"/>
-          </a:fillRef>
-          <a:effectRef idx="0">
-            <a:schemeClr val="accent1"/>
-          </a:effectRef>
-          <a:fontRef idx="minor">
-            <a:schemeClr val="tx1"/>
-          </a:fontRef>
-        </p:style>
-        <p:txBody>
-          <a:bodyPr wrap="none" rtlCol="0" anchor="ctr"/>
-          <a:lstStyle/>
-          <a:p>
-            <a:pPr algn="ctr"/>
-            <a:r>
-              <a:rPr kumimoji="1" lang="en-US" altLang="ja-JP" sz="1100" dirty="0"/>
-              <a:t>REQ</a:t>
-            </a:r>
-            <a:endParaRPr kumimoji="1" lang="ja-JP" altLang="en-US" sz="1100"/>
-          </a:p>
-        </p:txBody>
-      </p:sp>
-      <p:sp>
-        <p:nvSpPr>
-          <p:cNvPr id="21" name="円/楕円 20">
-            <a:extLst>
-              <a:ext uri="{FF2B5EF4-FFF2-40B4-BE49-F238E27FC236}">
-                <a16:creationId xmlns:a16="http://schemas.microsoft.com/office/drawing/2014/main" id="{4813BEFE-248F-4F41-861B-807CD38D9632}"/>
-              </a:ext>
-            </a:extLst>
-          </p:cNvPr>
-          <p:cNvSpPr/>
-          <p:nvPr/>
-        </p:nvSpPr>
-        <p:spPr>
-          <a:xfrm>
-            <a:off x="3788229" y="1930400"/>
-            <a:ext cx="348343" cy="333829"/>
-          </a:xfrm>
-          <a:prstGeom prst="ellipse">
-            <a:avLst/>
-          </a:prstGeom>
-          <a:ln>
-            <a:solidFill>
-              <a:schemeClr val="tx1"/>
-            </a:solidFill>
-            <a:headEnd type="none" w="med" len="med"/>
-            <a:tailEnd type="none" w="med" len="med"/>
-          </a:ln>
-        </p:spPr>
-        <p:style>
-          <a:lnRef idx="1">
-            <a:schemeClr val="accent1"/>
-          </a:lnRef>
-          <a:fillRef idx="0">
-            <a:schemeClr val="accent1"/>
-          </a:fillRef>
-          <a:effectRef idx="0">
-            <a:schemeClr val="accent1"/>
-          </a:effectRef>
-          <a:fontRef idx="minor">
-            <a:schemeClr val="tx1"/>
-          </a:fontRef>
-        </p:style>
-        <p:txBody>
-          <a:bodyPr wrap="none" rtlCol="0" anchor="ctr"/>
-          <a:lstStyle/>
-          <a:p>
-            <a:pPr algn="ctr"/>
-            <a:r>
-              <a:rPr kumimoji="1" lang="en-US" altLang="ja-JP" sz="1100" dirty="0"/>
-              <a:t>BUSY</a:t>
-            </a:r>
-            <a:endParaRPr kumimoji="1" lang="ja-JP" altLang="en-US" sz="1100"/>
-          </a:p>
-        </p:txBody>
-      </p:sp>
-      <p:sp>
-        <p:nvSpPr>
-          <p:cNvPr id="22" name="テキスト ボックス 21">
-            <a:extLst>
-              <a:ext uri="{FF2B5EF4-FFF2-40B4-BE49-F238E27FC236}">
-                <a16:creationId xmlns:a16="http://schemas.microsoft.com/office/drawing/2014/main" id="{93FF2424-173B-1D4E-A126-C08FD292A841}"/>
-              </a:ext>
-            </a:extLst>
-          </p:cNvPr>
-          <p:cNvSpPr txBox="1"/>
-          <p:nvPr/>
-        </p:nvSpPr>
-        <p:spPr>
-          <a:xfrm>
-            <a:off x="5188858" y="2627086"/>
-            <a:ext cx="3628572" cy="2123658"/>
-          </a:xfrm>
-          <a:prstGeom prst="rect">
-            <a:avLst/>
-          </a:prstGeom>
-          <a:noFill/>
-        </p:spPr>
-        <p:txBody>
-          <a:bodyPr wrap="square" rtlCol="0">
-            <a:spAutoFit/>
-          </a:bodyPr>
-          <a:lstStyle/>
-          <a:p>
-            <a:pPr marL="285750" indent="-285750">
-              <a:buFont typeface="Arial" panose="020B0604020202020204" pitchFamily="34" charset="0"/>
-              <a:buChar char="•"/>
-            </a:pPr>
-            <a:r>
-              <a:rPr kumimoji="1" lang="en-US" altLang="ja-JP" sz="1200" dirty="0"/>
-              <a:t>IDLE</a:t>
-            </a:r>
-          </a:p>
-          <a:p>
-            <a:pPr marL="742950" lvl="1" indent="-285750">
-              <a:buFont typeface="Arial" panose="020B0604020202020204" pitchFamily="34" charset="0"/>
-              <a:buChar char="•"/>
-            </a:pPr>
-            <a:r>
-              <a:rPr kumimoji="1" lang="en-US" altLang="ja-JP" sz="1200" dirty="0"/>
-              <a:t>TXEMP</a:t>
-            </a:r>
-            <a:r>
-              <a:rPr kumimoji="1" lang="ja-JP" altLang="en-US" sz="1200"/>
-              <a:t>は</a:t>
-            </a:r>
-            <a:r>
-              <a:rPr kumimoji="1" lang="en-US" altLang="ja-JP" sz="1200" dirty="0"/>
-              <a:t>’1’</a:t>
-            </a:r>
-          </a:p>
-          <a:p>
-            <a:pPr marL="285750" indent="-285750">
-              <a:buFont typeface="Arial" panose="020B0604020202020204" pitchFamily="34" charset="0"/>
-              <a:buChar char="•"/>
-            </a:pPr>
-            <a:r>
-              <a:rPr kumimoji="1" lang="en-US" altLang="ja-JP" sz="1200" dirty="0"/>
-              <a:t>REQ</a:t>
-            </a:r>
-          </a:p>
-          <a:p>
-            <a:pPr marL="742950" lvl="1" indent="-285750">
-              <a:buFont typeface="Arial" panose="020B0604020202020204" pitchFamily="34" charset="0"/>
-              <a:buChar char="•"/>
-            </a:pPr>
-            <a:r>
-              <a:rPr kumimoji="1" lang="en-US" altLang="ja-JP" sz="1200" dirty="0"/>
-              <a:t>TXEMP</a:t>
-            </a:r>
-            <a:r>
-              <a:rPr kumimoji="1" lang="ja-JP" altLang="en-US" sz="1200"/>
-              <a:t>は</a:t>
-            </a:r>
-            <a:r>
-              <a:rPr kumimoji="1" lang="en-US" altLang="ja-JP" sz="1200" dirty="0"/>
-              <a:t>’0’</a:t>
-            </a:r>
-          </a:p>
-          <a:p>
-            <a:pPr marL="742950" lvl="1" indent="-285750">
-              <a:buFont typeface="Arial" panose="020B0604020202020204" pitchFamily="34" charset="0"/>
-              <a:buChar char="•"/>
-            </a:pPr>
-            <a:r>
-              <a:rPr kumimoji="1" lang="ja-JP" altLang="en-US" sz="1200"/>
-              <a:t>この間に</a:t>
-            </a:r>
-            <a:r>
-              <a:rPr kumimoji="1" lang="en-US" altLang="ja-JP" sz="1200" dirty="0"/>
-              <a:t>BUSREQ</a:t>
-            </a:r>
-            <a:r>
-              <a:rPr kumimoji="1" lang="ja-JP" altLang="en-US" sz="1200"/>
-              <a:t>を出して</a:t>
-            </a:r>
-            <a:r>
-              <a:rPr kumimoji="1" lang="en-US" altLang="ja-JP" sz="1200" dirty="0"/>
-              <a:t>BUSGNT</a:t>
-            </a:r>
-            <a:r>
-              <a:rPr kumimoji="1" lang="ja-JP" altLang="en-US" sz="1200"/>
-              <a:t>がアクティブになるのを待つ</a:t>
-            </a:r>
-            <a:endParaRPr kumimoji="1" lang="en-US" altLang="ja-JP" sz="1200" dirty="0"/>
-          </a:p>
-          <a:p>
-            <a:pPr marL="285750" indent="-285750">
-              <a:buFont typeface="Arial" panose="020B0604020202020204" pitchFamily="34" charset="0"/>
-              <a:buChar char="•"/>
-            </a:pPr>
-            <a:r>
-              <a:rPr kumimoji="1" lang="en-US" altLang="ja-JP" sz="1200" dirty="0"/>
-              <a:t>BUSY</a:t>
-            </a:r>
-          </a:p>
-          <a:p>
-            <a:pPr marL="742950" lvl="1" indent="-285750">
-              <a:buFont typeface="Arial" panose="020B0604020202020204" pitchFamily="34" charset="0"/>
-              <a:buChar char="•"/>
-            </a:pPr>
-            <a:r>
-              <a:rPr kumimoji="1" lang="en-US" altLang="ja-JP" sz="1200" dirty="0"/>
-              <a:t>TXEMP</a:t>
-            </a:r>
-            <a:r>
-              <a:rPr kumimoji="1" lang="ja-JP" altLang="en-US" sz="1200"/>
-              <a:t>は</a:t>
-            </a:r>
-            <a:r>
-              <a:rPr kumimoji="1" lang="en-US" altLang="ja-JP" sz="1200" dirty="0"/>
-              <a:t>TXEMP_ORG</a:t>
-            </a:r>
-            <a:r>
-              <a:rPr kumimoji="1" lang="ja-JP" altLang="en-US" sz="1200"/>
-              <a:t>がスルーされる</a:t>
-            </a:r>
-            <a:endParaRPr kumimoji="1" lang="en-US" altLang="ja-JP" sz="1200" dirty="0"/>
-          </a:p>
-          <a:p>
-            <a:pPr marL="742950" lvl="1" indent="-285750">
-              <a:buFont typeface="Arial" panose="020B0604020202020204" pitchFamily="34" charset="0"/>
-              <a:buChar char="•"/>
-            </a:pPr>
-            <a:r>
-              <a:rPr kumimoji="1" lang="ja-JP" altLang="en-US" sz="1200"/>
-              <a:t>この間はずっと</a:t>
-            </a:r>
-            <a:r>
-              <a:rPr kumimoji="1" lang="en-US" altLang="ja-JP" sz="1200" dirty="0"/>
-              <a:t>BUSACK</a:t>
-            </a:r>
-            <a:r>
-              <a:rPr kumimoji="1" lang="ja-JP" altLang="en-US" sz="1200"/>
-              <a:t>をアクティブにしておくとバスが占有できる</a:t>
-            </a:r>
-            <a:endParaRPr kumimoji="1" lang="en-US" altLang="ja-JP" sz="1200" dirty="0"/>
-          </a:p>
-          <a:p>
-            <a:pPr marL="285750" indent="-285750">
-              <a:buFont typeface="Arial" panose="020B0604020202020204" pitchFamily="34" charset="0"/>
-              <a:buChar char="•"/>
-            </a:pPr>
-            <a:endParaRPr kumimoji="1" lang="en-US" altLang="ja-JP" sz="1200" dirty="0"/>
-          </a:p>
-        </p:txBody>
-      </p:sp>
-      <p:sp>
-        <p:nvSpPr>
-          <p:cNvPr id="23" name="テキスト ボックス 22">
-            <a:extLst>
-              <a:ext uri="{FF2B5EF4-FFF2-40B4-BE49-F238E27FC236}">
-                <a16:creationId xmlns:a16="http://schemas.microsoft.com/office/drawing/2014/main" id="{12A8B1D2-0E21-8B40-AC3F-78E71F78E1A9}"/>
-              </a:ext>
-            </a:extLst>
-          </p:cNvPr>
-          <p:cNvSpPr txBox="1"/>
-          <p:nvPr/>
-        </p:nvSpPr>
-        <p:spPr>
-          <a:xfrm>
-            <a:off x="1093355" y="1844811"/>
-            <a:ext cx="649537" cy="200055"/>
-          </a:xfrm>
-          <a:prstGeom prst="rect">
-            <a:avLst/>
-          </a:prstGeom>
-          <a:noFill/>
-        </p:spPr>
-        <p:txBody>
-          <a:bodyPr wrap="none" rtlCol="0">
-            <a:spAutoFit/>
-          </a:bodyPr>
-          <a:lstStyle/>
-          <a:p>
-            <a:r>
-              <a:rPr kumimoji="1" lang="en-US" altLang="ja-JP" sz="700" dirty="0"/>
-              <a:t>TXEMP_ORG</a:t>
-            </a:r>
-          </a:p>
-        </p:txBody>
-      </p:sp>
-      <p:cxnSp>
-        <p:nvCxnSpPr>
-          <p:cNvPr id="24" name="直線矢印コネクタ 23">
-            <a:extLst>
-              <a:ext uri="{FF2B5EF4-FFF2-40B4-BE49-F238E27FC236}">
-                <a16:creationId xmlns:a16="http://schemas.microsoft.com/office/drawing/2014/main" id="{84FA146F-3173-BF4D-94B5-9D1B81FF63BD}"/>
-              </a:ext>
-            </a:extLst>
-          </p:cNvPr>
-          <p:cNvCxnSpPr>
-            <a:cxnSpLocks/>
-          </p:cNvCxnSpPr>
-          <p:nvPr/>
-        </p:nvCxnSpPr>
-        <p:spPr>
-          <a:xfrm>
-            <a:off x="437395" y="1941490"/>
-            <a:ext cx="662047" cy="0"/>
-          </a:xfrm>
-          <a:prstGeom prst="straightConnector1">
-            <a:avLst/>
-          </a:prstGeom>
-          <a:ln>
-            <a:solidFill>
-              <a:schemeClr val="tx1"/>
-            </a:solidFill>
-            <a:headEnd type="none" w="med" len="med"/>
-            <a:tailEnd type="triangle" w="med" len="med"/>
-          </a:ln>
-        </p:spPr>
-        <p:style>
-          <a:lnRef idx="1">
-            <a:schemeClr val="accent1"/>
-          </a:lnRef>
-          <a:fillRef idx="0">
-            <a:schemeClr val="accent1"/>
-          </a:fillRef>
-          <a:effectRef idx="0">
-            <a:schemeClr val="accent1"/>
-          </a:effectRef>
-          <a:fontRef idx="minor">
-            <a:schemeClr val="tx1"/>
-          </a:fontRef>
-        </p:style>
-      </p:cxnSp>
     </p:spTree>
     <p:extLst>
       <p:ext uri="{BB962C8B-B14F-4D97-AF65-F5344CB8AC3E}">

</xml_diff>